<commit_message>
Tesztelési rész + WPF + Backend hozzáadása
</commit_message>
<xml_diff>
--- a/VizsgaremekEnglishPP.pptx
+++ b/VizsgaremekEnglishPP.pptx
@@ -5,7 +5,7 @@
     <p:sldMasterId id="2147483648" r:id="rId1"/>
   </p:sldMasterIdLst>
   <p:notesMasterIdLst>
-    <p:notesMasterId r:id="rId13"/>
+    <p:notesMasterId r:id="rId17"/>
   </p:notesMasterIdLst>
   <p:sldIdLst>
     <p:sldId id="256" r:id="rId2"/>
@@ -17,8 +17,12 @@
     <p:sldId id="260" r:id="rId8"/>
     <p:sldId id="262" r:id="rId9"/>
     <p:sldId id="263" r:id="rId10"/>
-    <p:sldId id="264" r:id="rId11"/>
-    <p:sldId id="266" r:id="rId12"/>
+    <p:sldId id="267" r:id="rId11"/>
+    <p:sldId id="269" r:id="rId12"/>
+    <p:sldId id="264" r:id="rId13"/>
+    <p:sldId id="266" r:id="rId14"/>
+    <p:sldId id="268" r:id="rId15"/>
+    <p:sldId id="270" r:id="rId16"/>
   </p:sldIdLst>
   <p:sldSz cx="12192000" cy="6858000"/>
   <p:notesSz cx="6858000" cy="9144000"/>
@@ -117,15 +121,20 @@
       </a:defRPr>
     </a:lvl9pPr>
   </p:defaultTextStyle>
+  <p:extLst>
+    <p:ext uri="{EFAFB233-063F-42B5-8137-9DF3F51BA10A}">
+      <p15:sldGuideLst xmlns:p15="http://schemas.microsoft.com/office/powerpoint/2012/main"/>
+    </p:ext>
+  </p:extLst>
 </p:presentation>
 </file>
 
 <file path=ppt/revisionInfo.xml><?xml version="1.0" encoding="utf-8"?>
 <p1510:revInfo xmlns:a="http://schemas.openxmlformats.org/drawingml/2006/main" xmlns:r="http://schemas.openxmlformats.org/officeDocument/2006/relationships" xmlns:p1510="http://schemas.microsoft.com/office/powerpoint/2015/10/main">
   <p1510:revLst>
-    <p1510:client id="{1079E572-9078-E460-6BD6-D52B6B47D308}" v="283" dt="2026-01-29T07:19:19.125"/>
-    <p1510:client id="{1C26CF59-061F-B3DC-8637-6B619113F5B5}" v="12" dt="2026-01-29T06:58:26.184"/>
-    <p1510:client id="{F78506B0-3A28-7203-2963-4BF814FF8A09}" v="97" dt="2026-01-29T07:20:28.190"/>
+    <p1510:client id="{4DBC1750-D682-258D-DE56-86E93BC16F61}" v="48" dt="2026-02-02T07:23:12.910"/>
+    <p1510:client id="{BDD6FA4B-13F7-6471-AB26-A30FE67E54A7}" v="1190" dt="2026-02-02T07:19:48.737"/>
+    <p1510:client id="{E3DACB38-7507-3AC1-3E67-621DDCBE376F}" v="170" dt="2026-02-02T07:09:07.022"/>
   </p1510:revLst>
 </p1510:revInfo>
 </file>
@@ -276,7 +285,7 @@
           <a:p>
             <a:fld id="{1F6FFA99-551E-45B4-8370-7EE47DE7A2D9}" type="datetimeFigureOut">
               <a:rPr lang="hu-HU" smtClean="0"/>
-              <a:t>2026. 01. 31.</a:t>
+              <a:t>2026. 02. 01.</a:t>
             </a:fld>
             <a:endParaRPr lang="hu-HU"/>
           </a:p>
@@ -340,38 +349,37 @@
           <a:p>
             <a:pPr lvl="0"/>
             <a:r>
-              <a:rPr lang="hu-HU" smtClean="0"/>
+              <a:rPr lang="hu-HU"/>
               <a:t>Mintaszöveg szerkesztése</a:t>
             </a:r>
           </a:p>
           <a:p>
             <a:pPr lvl="1"/>
             <a:r>
-              <a:rPr lang="hu-HU" smtClean="0"/>
+              <a:rPr lang="hu-HU"/>
               <a:t>Második szint</a:t>
             </a:r>
           </a:p>
           <a:p>
             <a:pPr lvl="2"/>
             <a:r>
-              <a:rPr lang="hu-HU" smtClean="0"/>
+              <a:rPr lang="hu-HU"/>
               <a:t>Harmadik szint</a:t>
             </a:r>
           </a:p>
           <a:p>
             <a:pPr lvl="3"/>
             <a:r>
-              <a:rPr lang="hu-HU" smtClean="0"/>
+              <a:rPr lang="hu-HU"/>
               <a:t>Negyedik szint</a:t>
             </a:r>
           </a:p>
           <a:p>
             <a:pPr lvl="4"/>
             <a:r>
-              <a:rPr lang="hu-HU" smtClean="0"/>
+              <a:rPr lang="hu-HU"/>
               <a:t>Ötödik szint</a:t>
             </a:r>
-            <a:endParaRPr lang="hu-HU"/>
           </a:p>
         </p:txBody>
       </p:sp>
@@ -757,7 +765,7 @@
           <a:p>
             <a:fld id="{DB0193E8-478D-464D-8400-8CD4306FD776}" type="datetimeFigureOut">
               <a:rPr lang="hu-HU" smtClean="0"/>
-              <a:t>2026. 01. 31.</a:t>
+              <a:t>2026. 02. 01.</a:t>
             </a:fld>
             <a:endParaRPr lang="hu-HU"/>
           </a:p>
@@ -925,7 +933,7 @@
           <a:p>
             <a:fld id="{DB0193E8-478D-464D-8400-8CD4306FD776}" type="datetimeFigureOut">
               <a:rPr lang="hu-HU" smtClean="0"/>
-              <a:t>2026. 01. 31.</a:t>
+              <a:t>2026. 02. 01.</a:t>
             </a:fld>
             <a:endParaRPr lang="hu-HU"/>
           </a:p>
@@ -1103,7 +1111,7 @@
           <a:p>
             <a:fld id="{DB0193E8-478D-464D-8400-8CD4306FD776}" type="datetimeFigureOut">
               <a:rPr lang="hu-HU" smtClean="0"/>
-              <a:t>2026. 01. 31.</a:t>
+              <a:t>2026. 02. 01.</a:t>
             </a:fld>
             <a:endParaRPr lang="hu-HU"/>
           </a:p>
@@ -1271,7 +1279,7 @@
           <a:p>
             <a:fld id="{DB0193E8-478D-464D-8400-8CD4306FD776}" type="datetimeFigureOut">
               <a:rPr lang="hu-HU" smtClean="0"/>
-              <a:t>2026. 01. 31.</a:t>
+              <a:t>2026. 02. 01.</a:t>
             </a:fld>
             <a:endParaRPr lang="hu-HU"/>
           </a:p>
@@ -1516,7 +1524,7 @@
           <a:p>
             <a:fld id="{DB0193E8-478D-464D-8400-8CD4306FD776}" type="datetimeFigureOut">
               <a:rPr lang="hu-HU" smtClean="0"/>
-              <a:t>2026. 01. 31.</a:t>
+              <a:t>2026. 02. 01.</a:t>
             </a:fld>
             <a:endParaRPr lang="hu-HU"/>
           </a:p>
@@ -1745,7 +1753,7 @@
           <a:p>
             <a:fld id="{DB0193E8-478D-464D-8400-8CD4306FD776}" type="datetimeFigureOut">
               <a:rPr lang="hu-HU" smtClean="0"/>
-              <a:t>2026. 01. 31.</a:t>
+              <a:t>2026. 02. 01.</a:t>
             </a:fld>
             <a:endParaRPr lang="hu-HU"/>
           </a:p>
@@ -2109,7 +2117,7 @@
           <a:p>
             <a:fld id="{DB0193E8-478D-464D-8400-8CD4306FD776}" type="datetimeFigureOut">
               <a:rPr lang="hu-HU" smtClean="0"/>
-              <a:t>2026. 01. 31.</a:t>
+              <a:t>2026. 02. 01.</a:t>
             </a:fld>
             <a:endParaRPr lang="hu-HU"/>
           </a:p>
@@ -2226,7 +2234,7 @@
           <a:p>
             <a:fld id="{DB0193E8-478D-464D-8400-8CD4306FD776}" type="datetimeFigureOut">
               <a:rPr lang="hu-HU" smtClean="0"/>
-              <a:t>2026. 01. 31.</a:t>
+              <a:t>2026. 02. 01.</a:t>
             </a:fld>
             <a:endParaRPr lang="hu-HU"/>
           </a:p>
@@ -2321,7 +2329,7 @@
           <a:p>
             <a:fld id="{DB0193E8-478D-464D-8400-8CD4306FD776}" type="datetimeFigureOut">
               <a:rPr lang="hu-HU" smtClean="0"/>
-              <a:t>2026. 01. 31.</a:t>
+              <a:t>2026. 02. 01.</a:t>
             </a:fld>
             <a:endParaRPr lang="hu-HU"/>
           </a:p>
@@ -2596,7 +2604,7 @@
           <a:p>
             <a:fld id="{DB0193E8-478D-464D-8400-8CD4306FD776}" type="datetimeFigureOut">
               <a:rPr lang="hu-HU" smtClean="0"/>
-              <a:t>2026. 01. 31.</a:t>
+              <a:t>2026. 02. 01.</a:t>
             </a:fld>
             <a:endParaRPr lang="hu-HU"/>
           </a:p>
@@ -2848,7 +2856,7 @@
           <a:p>
             <a:fld id="{DB0193E8-478D-464D-8400-8CD4306FD776}" type="datetimeFigureOut">
               <a:rPr lang="hu-HU" smtClean="0"/>
-              <a:t>2026. 01. 31.</a:t>
+              <a:t>2026. 02. 01.</a:t>
             </a:fld>
             <a:endParaRPr lang="hu-HU"/>
           </a:p>
@@ -3059,7 +3067,7 @@
           <a:p>
             <a:fld id="{DB0193E8-478D-464D-8400-8CD4306FD776}" type="datetimeFigureOut">
               <a:rPr lang="hu-HU" smtClean="0"/>
-              <a:t>2026. 01. 31.</a:t>
+              <a:t>2026. 02. 01.</a:t>
             </a:fld>
             <a:endParaRPr lang="hu-HU"/>
           </a:p>
@@ -3875,6 +3883,1866 @@
         <p:cNvPr id="1" name="">
           <a:extLst>
             <a:ext uri="{FF2B5EF4-FFF2-40B4-BE49-F238E27FC236}">
+              <a16:creationId xmlns:a16="http://schemas.microsoft.com/office/drawing/2014/main" id="{94BB689D-C470-AD9C-B531-2B23CF074029}"/>
+            </a:ext>
+          </a:extLst>
+        </p:cNvPr>
+        <p:cNvGrpSpPr/>
+        <p:nvPr/>
+      </p:nvGrpSpPr>
+      <p:grpSpPr>
+        <a:xfrm>
+          <a:off x="0" y="0"/>
+          <a:ext cx="0" cy="0"/>
+          <a:chOff x="0" y="0"/>
+          <a:chExt cx="0" cy="0"/>
+        </a:xfrm>
+      </p:grpSpPr>
+      <p:sp>
+        <p:nvSpPr>
+          <p:cNvPr id="4" name="Téglalap 3">
+            <a:extLst>
+              <a:ext uri="{FF2B5EF4-FFF2-40B4-BE49-F238E27FC236}">
+                <a16:creationId xmlns:a16="http://schemas.microsoft.com/office/drawing/2014/main" id="{96E0EFC6-7CF8-B4E5-1539-F073723D45A7}"/>
+              </a:ext>
+            </a:extLst>
+          </p:cNvPr>
+          <p:cNvSpPr/>
+          <p:nvPr/>
+        </p:nvSpPr>
+        <p:spPr>
+          <a:xfrm>
+            <a:off x="0" y="0"/>
+            <a:ext cx="12192000" cy="819150"/>
+          </a:xfrm>
+          <a:prstGeom prst="rect">
+            <a:avLst/>
+          </a:prstGeom>
+          <a:solidFill>
+            <a:schemeClr val="accent1">
+              <a:lumMod val="60000"/>
+              <a:lumOff val="40000"/>
+            </a:schemeClr>
+          </a:solidFill>
+          <a:ln>
+            <a:noFill/>
+          </a:ln>
+        </p:spPr>
+        <p:style>
+          <a:lnRef idx="2">
+            <a:schemeClr val="accent1">
+              <a:shade val="50000"/>
+            </a:schemeClr>
+          </a:lnRef>
+          <a:fillRef idx="1">
+            <a:schemeClr val="accent1"/>
+          </a:fillRef>
+          <a:effectRef idx="0">
+            <a:schemeClr val="accent1"/>
+          </a:effectRef>
+          <a:fontRef idx="minor">
+            <a:schemeClr val="lt1"/>
+          </a:fontRef>
+        </p:style>
+        <p:txBody>
+          <a:bodyPr rtlCol="0" anchor="ctr"/>
+          <a:lstStyle/>
+          <a:p>
+            <a:pPr algn="ctr"/>
+            <a:endParaRPr lang="hu-HU">
+              <a:solidFill>
+                <a:schemeClr val="tx1"/>
+              </a:solidFill>
+            </a:endParaRPr>
+          </a:p>
+        </p:txBody>
+      </p:sp>
+      <p:pic>
+        <p:nvPicPr>
+          <p:cNvPr id="3" name="Kép 2">
+            <a:extLst>
+              <a:ext uri="{FF2B5EF4-FFF2-40B4-BE49-F238E27FC236}">
+                <a16:creationId xmlns:a16="http://schemas.microsoft.com/office/drawing/2014/main" id="{58C21B68-41C5-5DAF-1E0A-61F08579598A}"/>
+              </a:ext>
+            </a:extLst>
+          </p:cNvPr>
+          <p:cNvPicPr>
+            <a:picLocks noChangeAspect="1"/>
+          </p:cNvPicPr>
+          <p:nvPr/>
+        </p:nvPicPr>
+        <p:blipFill>
+          <a:blip r:embed="rId2" cstate="print">
+            <a:extLst>
+              <a:ext uri="{28A0092B-C50C-407E-A947-70E740481C1C}">
+                <a14:useLocalDpi xmlns:a14="http://schemas.microsoft.com/office/drawing/2010/main" val="0"/>
+              </a:ext>
+            </a:extLst>
+          </a:blip>
+          <a:stretch>
+            <a:fillRect/>
+          </a:stretch>
+        </p:blipFill>
+        <p:spPr>
+          <a:xfrm>
+            <a:off x="140104" y="47687"/>
+            <a:ext cx="745721" cy="723776"/>
+          </a:xfrm>
+          <a:prstGeom prst="rect">
+            <a:avLst/>
+          </a:prstGeom>
+        </p:spPr>
+      </p:pic>
+      <p:sp>
+        <p:nvSpPr>
+          <p:cNvPr id="2" name="Szövegdoboz 1">
+            <a:extLst>
+              <a:ext uri="{FF2B5EF4-FFF2-40B4-BE49-F238E27FC236}">
+                <a16:creationId xmlns:a16="http://schemas.microsoft.com/office/drawing/2014/main" id="{4421AC52-0274-87B5-3810-4C8931298490}"/>
+              </a:ext>
+            </a:extLst>
+          </p:cNvPr>
+          <p:cNvSpPr txBox="1"/>
+          <p:nvPr/>
+        </p:nvSpPr>
+        <p:spPr>
+          <a:xfrm>
+            <a:off x="2801383" y="24854"/>
+            <a:ext cx="6589234" cy="769441"/>
+          </a:xfrm>
+          <a:prstGeom prst="rect">
+            <a:avLst/>
+          </a:prstGeom>
+          <a:noFill/>
+        </p:spPr>
+        <p:txBody>
+          <a:bodyPr wrap="square" lIns="91440" tIns="45720" rIns="91440" bIns="45720" rtlCol="0" anchor="t">
+            <a:spAutoFit/>
+          </a:bodyPr>
+          <a:lstStyle/>
+          <a:p>
+            <a:pPr algn="ctr"/>
+            <a:r>
+              <a:rPr lang="hu-HU" sz="4400" b="1" dirty="0">
+                <a:ln w="6350">
+                  <a:solidFill>
+                    <a:schemeClr val="accent1">
+                      <a:lumMod val="75000"/>
+                    </a:schemeClr>
+                  </a:solidFill>
+                </a:ln>
+                <a:solidFill>
+                  <a:schemeClr val="bg1"/>
+                </a:solidFill>
+                <a:latin typeface="Ink Free"/>
+              </a:rPr>
+              <a:t>Testing </a:t>
+            </a:r>
+            <a:r>
+              <a:rPr lang="hu-HU" sz="4400" b="1" dirty="0" err="1">
+                <a:ln w="6350">
+                  <a:solidFill>
+                    <a:schemeClr val="accent1">
+                      <a:lumMod val="75000"/>
+                    </a:schemeClr>
+                  </a:solidFill>
+                </a:ln>
+                <a:solidFill>
+                  <a:schemeClr val="bg1"/>
+                </a:solidFill>
+                <a:latin typeface="Ink Free"/>
+              </a:rPr>
+              <a:t>results</a:t>
+            </a:r>
+            <a:endParaRPr lang="hu-HU" sz="4400" b="1" dirty="0" err="1">
+              <a:ln w="6350">
+                <a:solidFill>
+                  <a:schemeClr val="accent1">
+                    <a:lumMod val="75000"/>
+                  </a:schemeClr>
+                </a:solidFill>
+              </a:ln>
+              <a:solidFill>
+                <a:schemeClr val="bg1"/>
+              </a:solidFill>
+              <a:latin typeface="Ink Free" panose="03080402000500000000" pitchFamily="66" charset="0"/>
+            </a:endParaRPr>
+          </a:p>
+        </p:txBody>
+      </p:sp>
+      <p:sp>
+        <p:nvSpPr>
+          <p:cNvPr id="12" name="Szövegdoboz 11">
+            <a:extLst>
+              <a:ext uri="{FF2B5EF4-FFF2-40B4-BE49-F238E27FC236}">
+                <a16:creationId xmlns:a16="http://schemas.microsoft.com/office/drawing/2014/main" id="{906963F0-9C25-C0CC-904F-0A059C079119}"/>
+              </a:ext>
+            </a:extLst>
+          </p:cNvPr>
+          <p:cNvSpPr txBox="1"/>
+          <p:nvPr/>
+        </p:nvSpPr>
+        <p:spPr>
+          <a:xfrm>
+            <a:off x="510659" y="970463"/>
+            <a:ext cx="11492853" cy="1200329"/>
+          </a:xfrm>
+          <a:prstGeom prst="rect">
+            <a:avLst/>
+          </a:prstGeom>
+          <a:noFill/>
+        </p:spPr>
+        <p:txBody>
+          <a:bodyPr wrap="square" lIns="91440" tIns="45720" rIns="91440" bIns="45720" rtlCol="0" anchor="t">
+            <a:spAutoFit/>
+          </a:bodyPr>
+          <a:lstStyle/>
+          <a:p>
+            <a:pPr marL="342900" indent="-342900">
+              <a:buFont typeface="Arial" panose="020B0604020202020204" pitchFamily="34" charset="0"/>
+              <a:buChar char="•"/>
+            </a:pPr>
+            <a:r>
+              <a:rPr lang="hu-HU" sz="2400" b="1" dirty="0" err="1">
+                <a:solidFill>
+                  <a:schemeClr val="accent4">
+                    <a:lumMod val="75000"/>
+                  </a:schemeClr>
+                </a:solidFill>
+              </a:rPr>
+              <a:t>Cannot</a:t>
+            </a:r>
+            <a:r>
+              <a:rPr lang="hu-HU" sz="2400" b="1" dirty="0">
+                <a:solidFill>
+                  <a:schemeClr val="accent4">
+                    <a:lumMod val="75000"/>
+                  </a:schemeClr>
+                </a:solidFill>
+              </a:rPr>
+              <a:t> </a:t>
+            </a:r>
+            <a:r>
+              <a:rPr lang="hu-HU" sz="2400" b="1" dirty="0" err="1">
+                <a:solidFill>
+                  <a:schemeClr val="accent4">
+                    <a:lumMod val="75000"/>
+                  </a:schemeClr>
+                </a:solidFill>
+              </a:rPr>
+              <a:t>connect</a:t>
+            </a:r>
+            <a:r>
+              <a:rPr lang="hu-HU" sz="2400" b="1" dirty="0">
+                <a:solidFill>
+                  <a:schemeClr val="accent4">
+                    <a:lumMod val="75000"/>
+                  </a:schemeClr>
+                </a:solidFill>
+              </a:rPr>
+              <a:t> </a:t>
+            </a:r>
+            <a:r>
+              <a:rPr lang="hu-HU" sz="2400" b="1" dirty="0" err="1">
+                <a:solidFill>
+                  <a:schemeClr val="accent4">
+                    <a:lumMod val="75000"/>
+                  </a:schemeClr>
+                </a:solidFill>
+              </a:rPr>
+              <a:t>to</a:t>
+            </a:r>
+            <a:r>
+              <a:rPr lang="hu-HU" sz="2400" b="1" dirty="0">
+                <a:solidFill>
+                  <a:schemeClr val="accent4">
+                    <a:lumMod val="75000"/>
+                  </a:schemeClr>
+                </a:solidFill>
+              </a:rPr>
+              <a:t> </a:t>
+            </a:r>
+            <a:r>
+              <a:rPr lang="hu-HU" sz="2400" b="1" dirty="0" err="1">
+                <a:solidFill>
+                  <a:schemeClr val="accent4">
+                    <a:lumMod val="75000"/>
+                  </a:schemeClr>
+                </a:solidFill>
+              </a:rPr>
+              <a:t>Database</a:t>
+            </a:r>
+            <a:r>
+              <a:rPr lang="hu-HU" sz="2400" dirty="0">
+                <a:solidFill>
+                  <a:schemeClr val="accent4">
+                    <a:lumMod val="75000"/>
+                  </a:schemeClr>
+                </a:solidFill>
+              </a:rPr>
+              <a:t>: </a:t>
+            </a:r>
+            <a:r>
+              <a:rPr lang="hu-HU" sz="2400" dirty="0" err="1">
+                <a:solidFill>
+                  <a:schemeClr val="accent4">
+                    <a:lumMod val="75000"/>
+                  </a:schemeClr>
+                </a:solidFill>
+              </a:rPr>
+              <a:t>If</a:t>
+            </a:r>
+            <a:r>
+              <a:rPr lang="hu-HU" sz="2400" dirty="0">
+                <a:solidFill>
+                  <a:schemeClr val="accent4">
+                    <a:lumMod val="75000"/>
+                  </a:schemeClr>
+                </a:solidFill>
+              </a:rPr>
+              <a:t> </a:t>
+            </a:r>
+            <a:r>
+              <a:rPr lang="hu-HU" sz="2400" dirty="0" err="1">
+                <a:solidFill>
+                  <a:schemeClr val="accent4">
+                    <a:lumMod val="75000"/>
+                  </a:schemeClr>
+                </a:solidFill>
+              </a:rPr>
+              <a:t>the</a:t>
+            </a:r>
+            <a:r>
+              <a:rPr lang="hu-HU" sz="2400" dirty="0">
+                <a:solidFill>
+                  <a:schemeClr val="accent4">
+                    <a:lumMod val="75000"/>
+                  </a:schemeClr>
+                </a:solidFill>
+              </a:rPr>
+              <a:t> Server </a:t>
+            </a:r>
+            <a:r>
+              <a:rPr lang="hu-HU" sz="2400" dirty="0" err="1">
+                <a:solidFill>
+                  <a:schemeClr val="accent4">
+                    <a:lumMod val="75000"/>
+                  </a:schemeClr>
+                </a:solidFill>
+              </a:rPr>
+              <a:t>cannot</a:t>
+            </a:r>
+            <a:r>
+              <a:rPr lang="hu-HU" sz="2400" dirty="0">
+                <a:solidFill>
+                  <a:schemeClr val="accent4">
+                    <a:lumMod val="75000"/>
+                  </a:schemeClr>
+                </a:solidFill>
+              </a:rPr>
+              <a:t> </a:t>
+            </a:r>
+            <a:r>
+              <a:rPr lang="hu-HU" sz="2400" dirty="0" err="1">
+                <a:solidFill>
+                  <a:schemeClr val="accent4">
+                    <a:lumMod val="75000"/>
+                  </a:schemeClr>
+                </a:solidFill>
+              </a:rPr>
+              <a:t>connect</a:t>
+            </a:r>
+            <a:r>
+              <a:rPr lang="hu-HU" sz="2400" dirty="0">
+                <a:solidFill>
+                  <a:schemeClr val="accent4">
+                    <a:lumMod val="75000"/>
+                  </a:schemeClr>
+                </a:solidFill>
+              </a:rPr>
+              <a:t> </a:t>
+            </a:r>
+            <a:r>
+              <a:rPr lang="hu-HU" sz="2400" dirty="0" err="1">
+                <a:solidFill>
+                  <a:schemeClr val="accent4">
+                    <a:lumMod val="75000"/>
+                  </a:schemeClr>
+                </a:solidFill>
+              </a:rPr>
+              <a:t>to</a:t>
+            </a:r>
+            <a:r>
+              <a:rPr lang="hu-HU" sz="2400" dirty="0">
+                <a:solidFill>
+                  <a:schemeClr val="accent4">
+                    <a:lumMod val="75000"/>
+                  </a:schemeClr>
+                </a:solidFill>
+              </a:rPr>
+              <a:t> </a:t>
+            </a:r>
+            <a:r>
+              <a:rPr lang="hu-HU" sz="2400" dirty="0" err="1">
+                <a:solidFill>
+                  <a:schemeClr val="accent4">
+                    <a:lumMod val="75000"/>
+                  </a:schemeClr>
+                </a:solidFill>
+              </a:rPr>
+              <a:t>the</a:t>
+            </a:r>
+            <a:r>
+              <a:rPr lang="hu-HU" sz="2400" dirty="0">
+                <a:solidFill>
+                  <a:schemeClr val="accent4">
+                    <a:lumMod val="75000"/>
+                  </a:schemeClr>
+                </a:solidFill>
+              </a:rPr>
+              <a:t> </a:t>
+            </a:r>
+            <a:r>
+              <a:rPr lang="hu-HU" sz="2400" dirty="0" err="1">
+                <a:solidFill>
+                  <a:schemeClr val="accent4">
+                    <a:lumMod val="75000"/>
+                  </a:schemeClr>
+                </a:solidFill>
+              </a:rPr>
+              <a:t>database</a:t>
+            </a:r>
+            <a:r>
+              <a:rPr lang="hu-HU" sz="2400" dirty="0">
+                <a:solidFill>
+                  <a:schemeClr val="accent4">
+                    <a:lumMod val="75000"/>
+                  </a:schemeClr>
+                </a:solidFill>
+              </a:rPr>
+              <a:t>, </a:t>
+            </a:r>
+            <a:r>
+              <a:rPr lang="hu-HU" sz="2400" dirty="0" err="1">
+                <a:solidFill>
+                  <a:schemeClr val="accent4">
+                    <a:lumMod val="75000"/>
+                  </a:schemeClr>
+                </a:solidFill>
+              </a:rPr>
+              <a:t>for</a:t>
+            </a:r>
+            <a:r>
+              <a:rPr lang="hu-HU" sz="2400" dirty="0">
+                <a:solidFill>
+                  <a:schemeClr val="accent4">
+                    <a:lumMod val="75000"/>
+                  </a:schemeClr>
+                </a:solidFill>
+              </a:rPr>
+              <a:t> </a:t>
+            </a:r>
+            <a:r>
+              <a:rPr lang="hu-HU" sz="2400" dirty="0" err="1">
+                <a:solidFill>
+                  <a:schemeClr val="accent4">
+                    <a:lumMod val="75000"/>
+                  </a:schemeClr>
+                </a:solidFill>
+              </a:rPr>
+              <a:t>some</a:t>
+            </a:r>
+            <a:r>
+              <a:rPr lang="hu-HU" sz="2400" dirty="0">
+                <a:solidFill>
+                  <a:schemeClr val="accent4">
+                    <a:lumMod val="75000"/>
+                  </a:schemeClr>
+                </a:solidFill>
+              </a:rPr>
+              <a:t> </a:t>
+            </a:r>
+            <a:r>
+              <a:rPr lang="hu-HU" sz="2400" dirty="0" err="1">
+                <a:solidFill>
+                  <a:schemeClr val="accent4">
+                    <a:lumMod val="75000"/>
+                  </a:schemeClr>
+                </a:solidFill>
+              </a:rPr>
+              <a:t>reason</a:t>
+            </a:r>
+            <a:r>
+              <a:rPr lang="hu-HU" sz="2400" dirty="0">
+                <a:solidFill>
+                  <a:schemeClr val="accent4">
+                    <a:lumMod val="75000"/>
+                  </a:schemeClr>
+                </a:solidFill>
+              </a:rPr>
+              <a:t>, </a:t>
+            </a:r>
+            <a:r>
+              <a:rPr lang="hu-HU" sz="2400" dirty="0" err="1">
+                <a:solidFill>
+                  <a:schemeClr val="accent4">
+                    <a:lumMod val="75000"/>
+                  </a:schemeClr>
+                </a:solidFill>
+              </a:rPr>
+              <a:t>for</a:t>
+            </a:r>
+            <a:r>
+              <a:rPr lang="hu-HU" sz="2400" dirty="0">
+                <a:solidFill>
+                  <a:schemeClr val="accent4">
+                    <a:lumMod val="75000"/>
+                  </a:schemeClr>
+                </a:solidFill>
+              </a:rPr>
+              <a:t> </a:t>
+            </a:r>
+            <a:r>
+              <a:rPr lang="hu-HU" sz="2400" dirty="0" err="1">
+                <a:solidFill>
+                  <a:schemeClr val="accent4">
+                    <a:lumMod val="75000"/>
+                  </a:schemeClr>
+                </a:solidFill>
+              </a:rPr>
+              <a:t>example</a:t>
+            </a:r>
+            <a:r>
+              <a:rPr lang="hu-HU" sz="2400" dirty="0">
+                <a:solidFill>
+                  <a:schemeClr val="accent4">
+                    <a:lumMod val="75000"/>
+                  </a:schemeClr>
+                </a:solidFill>
+              </a:rPr>
+              <a:t>: </a:t>
+            </a:r>
+            <a:r>
+              <a:rPr lang="hu-HU" sz="2400" dirty="0" err="1">
+                <a:solidFill>
+                  <a:schemeClr val="accent4">
+                    <a:lumMod val="75000"/>
+                  </a:schemeClr>
+                </a:solidFill>
+              </a:rPr>
+              <a:t>lack</a:t>
+            </a:r>
+            <a:r>
+              <a:rPr lang="hu-HU" sz="2400" dirty="0">
+                <a:solidFill>
+                  <a:schemeClr val="accent4">
+                    <a:lumMod val="75000"/>
+                  </a:schemeClr>
+                </a:solidFill>
+              </a:rPr>
+              <a:t> of XAMPP, </a:t>
+            </a:r>
+            <a:r>
+              <a:rPr lang="hu-HU" sz="2400" dirty="0" err="1">
+                <a:solidFill>
+                  <a:schemeClr val="accent4">
+                    <a:lumMod val="75000"/>
+                  </a:schemeClr>
+                </a:solidFill>
+              </a:rPr>
+              <a:t>or</a:t>
+            </a:r>
+            <a:r>
+              <a:rPr lang="hu-HU" sz="2400" dirty="0">
+                <a:solidFill>
+                  <a:schemeClr val="accent4">
+                    <a:lumMod val="75000"/>
+                  </a:schemeClr>
+                </a:solidFill>
+              </a:rPr>
+              <a:t> </a:t>
+            </a:r>
+            <a:r>
+              <a:rPr lang="hu-HU" sz="2400" dirty="0" err="1">
+                <a:solidFill>
+                  <a:schemeClr val="accent4">
+                    <a:lumMod val="75000"/>
+                  </a:schemeClr>
+                </a:solidFill>
+              </a:rPr>
+              <a:t>some</a:t>
+            </a:r>
+            <a:r>
+              <a:rPr lang="hu-HU" sz="2400" dirty="0">
+                <a:solidFill>
+                  <a:schemeClr val="accent4">
+                    <a:lumMod val="75000"/>
+                  </a:schemeClr>
+                </a:solidFill>
+              </a:rPr>
+              <a:t> </a:t>
+            </a:r>
+            <a:r>
+              <a:rPr lang="hu-HU" sz="2400" dirty="0" err="1">
+                <a:solidFill>
+                  <a:schemeClr val="accent4">
+                    <a:lumMod val="75000"/>
+                  </a:schemeClr>
+                </a:solidFill>
+              </a:rPr>
+              <a:t>kind</a:t>
+            </a:r>
+            <a:r>
+              <a:rPr lang="hu-HU" sz="2400" dirty="0">
+                <a:solidFill>
+                  <a:schemeClr val="accent4">
+                    <a:lumMod val="75000"/>
+                  </a:schemeClr>
+                </a:solidFill>
+              </a:rPr>
+              <a:t> of </a:t>
+            </a:r>
+            <a:r>
+              <a:rPr lang="hu-HU" sz="2400" dirty="0" err="1">
+                <a:solidFill>
+                  <a:schemeClr val="accent4">
+                    <a:lumMod val="75000"/>
+                  </a:schemeClr>
+                </a:solidFill>
+              </a:rPr>
+              <a:t>issue</a:t>
+            </a:r>
+            <a:r>
+              <a:rPr lang="hu-HU" sz="2400" dirty="0">
+                <a:solidFill>
+                  <a:schemeClr val="accent4">
+                    <a:lumMod val="75000"/>
+                  </a:schemeClr>
+                </a:solidFill>
+              </a:rPr>
+              <a:t>, </a:t>
+            </a:r>
+            <a:r>
+              <a:rPr lang="hu-HU" sz="2400" dirty="0" err="1">
+                <a:solidFill>
+                  <a:schemeClr val="accent4">
+                    <a:lumMod val="75000"/>
+                  </a:schemeClr>
+                </a:solidFill>
+              </a:rPr>
+              <a:t>the</a:t>
+            </a:r>
+            <a:r>
+              <a:rPr lang="hu-HU" sz="2400" dirty="0">
+                <a:solidFill>
+                  <a:schemeClr val="accent4">
+                    <a:lumMod val="75000"/>
+                  </a:schemeClr>
+                </a:solidFill>
+              </a:rPr>
+              <a:t> website </a:t>
+            </a:r>
+            <a:r>
+              <a:rPr lang="hu-HU" sz="2400" dirty="0" err="1">
+                <a:solidFill>
+                  <a:schemeClr val="accent4">
+                    <a:lumMod val="75000"/>
+                  </a:schemeClr>
+                </a:solidFill>
+              </a:rPr>
+              <a:t>will</a:t>
+            </a:r>
+            <a:r>
+              <a:rPr lang="hu-HU" sz="2400" dirty="0">
+                <a:solidFill>
+                  <a:schemeClr val="accent4">
+                    <a:lumMod val="75000"/>
+                  </a:schemeClr>
+                </a:solidFill>
+              </a:rPr>
+              <a:t> </a:t>
+            </a:r>
+            <a:r>
+              <a:rPr lang="hu-HU" sz="2400" dirty="0" err="1">
+                <a:solidFill>
+                  <a:schemeClr val="accent4">
+                    <a:lumMod val="75000"/>
+                  </a:schemeClr>
+                </a:solidFill>
+              </a:rPr>
+              <a:t>handle</a:t>
+            </a:r>
+            <a:r>
+              <a:rPr lang="hu-HU" sz="2400" dirty="0">
+                <a:solidFill>
+                  <a:schemeClr val="accent4">
+                    <a:lumMod val="75000"/>
+                  </a:schemeClr>
+                </a:solidFill>
+              </a:rPr>
+              <a:t> </a:t>
+            </a:r>
+            <a:r>
+              <a:rPr lang="hu-HU" sz="2400" dirty="0" err="1">
+                <a:solidFill>
+                  <a:schemeClr val="accent4">
+                    <a:lumMod val="75000"/>
+                  </a:schemeClr>
+                </a:solidFill>
+              </a:rPr>
+              <a:t>it</a:t>
+            </a:r>
+            <a:r>
+              <a:rPr lang="hu-HU" sz="2400" dirty="0">
+                <a:solidFill>
+                  <a:schemeClr val="accent4">
+                    <a:lumMod val="75000"/>
+                  </a:schemeClr>
+                </a:solidFill>
+              </a:rPr>
+              <a:t>, and </a:t>
+            </a:r>
+            <a:r>
+              <a:rPr lang="hu-HU" sz="2400" dirty="0" err="1">
+                <a:solidFill>
+                  <a:schemeClr val="accent4">
+                    <a:lumMod val="75000"/>
+                  </a:schemeClr>
+                </a:solidFill>
+              </a:rPr>
+              <a:t>it</a:t>
+            </a:r>
+            <a:r>
+              <a:rPr lang="hu-HU" sz="2400" dirty="0">
+                <a:solidFill>
+                  <a:schemeClr val="accent4">
+                    <a:lumMod val="75000"/>
+                  </a:schemeClr>
+                </a:solidFill>
+              </a:rPr>
+              <a:t> </a:t>
+            </a:r>
+            <a:r>
+              <a:rPr lang="hu-HU" sz="2400" dirty="0" err="1">
+                <a:solidFill>
+                  <a:schemeClr val="accent4">
+                    <a:lumMod val="75000"/>
+                  </a:schemeClr>
+                </a:solidFill>
+              </a:rPr>
+              <a:t>won't</a:t>
+            </a:r>
+            <a:r>
+              <a:rPr lang="hu-HU" sz="2400" dirty="0">
+                <a:solidFill>
+                  <a:schemeClr val="accent4">
+                    <a:lumMod val="75000"/>
+                  </a:schemeClr>
+                </a:solidFill>
+              </a:rPr>
+              <a:t> </a:t>
+            </a:r>
+            <a:r>
+              <a:rPr lang="hu-HU" sz="2400" dirty="0" err="1">
+                <a:solidFill>
+                  <a:schemeClr val="accent4">
+                    <a:lumMod val="75000"/>
+                  </a:schemeClr>
+                </a:solidFill>
+              </a:rPr>
+              <a:t>crash</a:t>
+            </a:r>
+            <a:r>
+              <a:rPr lang="hu-HU" sz="2400" dirty="0">
+                <a:solidFill>
+                  <a:schemeClr val="accent4">
+                    <a:lumMod val="75000"/>
+                  </a:schemeClr>
+                </a:solidFill>
+              </a:rPr>
+              <a:t>!</a:t>
+            </a:r>
+            <a:endParaRPr lang="hu-HU" sz="2400" dirty="0">
+              <a:solidFill>
+                <a:schemeClr val="accent4">
+                  <a:lumMod val="75000"/>
+                </a:schemeClr>
+              </a:solidFill>
+              <a:ea typeface="Calibri"/>
+              <a:cs typeface="Calibri"/>
+            </a:endParaRPr>
+          </a:p>
+        </p:txBody>
+      </p:sp>
+      <p:pic>
+        <p:nvPicPr>
+          <p:cNvPr id="8" name="Kép 7" descr="A képen szöveg, képernyőkép, tervezés látható&#10;&#10;Lehet, hogy az AI által létrehozott tartalom helytelen.">
+            <a:extLst>
+              <a:ext uri="{FF2B5EF4-FFF2-40B4-BE49-F238E27FC236}">
+                <a16:creationId xmlns:a16="http://schemas.microsoft.com/office/drawing/2014/main" id="{792F4D1D-5793-A3EB-E4DF-133338F31687}"/>
+              </a:ext>
+            </a:extLst>
+          </p:cNvPr>
+          <p:cNvPicPr>
+            <a:picLocks noChangeAspect="1"/>
+          </p:cNvPicPr>
+          <p:nvPr/>
+        </p:nvPicPr>
+        <p:blipFill>
+          <a:blip r:embed="rId3"/>
+          <a:stretch>
+            <a:fillRect/>
+          </a:stretch>
+        </p:blipFill>
+        <p:spPr>
+          <a:xfrm>
+            <a:off x="135699" y="3145727"/>
+            <a:ext cx="7870521" cy="2069670"/>
+          </a:xfrm>
+          <a:prstGeom prst="rect">
+            <a:avLst/>
+          </a:prstGeom>
+          <a:ln w="57150">
+            <a:solidFill>
+              <a:schemeClr val="accent1">
+                <a:lumMod val="40000"/>
+                <a:lumOff val="60000"/>
+              </a:schemeClr>
+            </a:solidFill>
+          </a:ln>
+        </p:spPr>
+      </p:pic>
+      <p:sp>
+        <p:nvSpPr>
+          <p:cNvPr id="11" name="Szövegdoboz 10">
+            <a:extLst>
+              <a:ext uri="{FF2B5EF4-FFF2-40B4-BE49-F238E27FC236}">
+                <a16:creationId xmlns:a16="http://schemas.microsoft.com/office/drawing/2014/main" id="{BB13FA43-C07D-5FA3-AD73-9B656B3AB0F9}"/>
+              </a:ext>
+            </a:extLst>
+          </p:cNvPr>
+          <p:cNvSpPr txBox="1"/>
+          <p:nvPr/>
+        </p:nvSpPr>
+        <p:spPr>
+          <a:xfrm>
+            <a:off x="510658" y="2504901"/>
+            <a:ext cx="2975156" cy="461665"/>
+          </a:xfrm>
+          <a:prstGeom prst="rect">
+            <a:avLst/>
+          </a:prstGeom>
+          <a:noFill/>
+        </p:spPr>
+        <p:txBody>
+          <a:bodyPr wrap="square" lIns="91440" tIns="45720" rIns="91440" bIns="45720" rtlCol="0" anchor="t">
+            <a:spAutoFit/>
+          </a:bodyPr>
+          <a:lstStyle/>
+          <a:p>
+            <a:pPr marL="342900" indent="-342900">
+              <a:buFont typeface="Arial" panose="020B0604020202020204" pitchFamily="34" charset="0"/>
+              <a:buChar char="•"/>
+            </a:pPr>
+            <a:r>
+              <a:rPr lang="hu-HU" sz="2400" b="1" dirty="0">
+                <a:solidFill>
+                  <a:schemeClr val="accent4">
+                    <a:lumMod val="75000"/>
+                  </a:schemeClr>
+                </a:solidFill>
+              </a:rPr>
+              <a:t>Frontend </a:t>
+            </a:r>
+            <a:r>
+              <a:rPr lang="hu-HU" sz="2400" b="1" dirty="0" err="1">
+                <a:solidFill>
+                  <a:schemeClr val="accent4">
+                    <a:lumMod val="75000"/>
+                  </a:schemeClr>
+                </a:solidFill>
+              </a:rPr>
+              <a:t>Handling</a:t>
+            </a:r>
+            <a:r>
+              <a:rPr lang="hu-HU" sz="2400" b="1" dirty="0">
+                <a:solidFill>
+                  <a:schemeClr val="accent4">
+                    <a:lumMod val="75000"/>
+                  </a:schemeClr>
+                </a:solidFill>
+              </a:rPr>
+              <a:t>:</a:t>
+            </a:r>
+            <a:endParaRPr lang="hu-HU" sz="2400" dirty="0">
+              <a:solidFill>
+                <a:schemeClr val="accent4">
+                  <a:lumMod val="75000"/>
+                </a:schemeClr>
+              </a:solidFill>
+              <a:ea typeface="Calibri"/>
+              <a:cs typeface="Calibri"/>
+            </a:endParaRPr>
+          </a:p>
+        </p:txBody>
+      </p:sp>
+      <p:sp>
+        <p:nvSpPr>
+          <p:cNvPr id="13" name="Szövegdoboz 12">
+            <a:extLst>
+              <a:ext uri="{FF2B5EF4-FFF2-40B4-BE49-F238E27FC236}">
+                <a16:creationId xmlns:a16="http://schemas.microsoft.com/office/drawing/2014/main" id="{0440CDCE-F4C1-0D36-F02B-03CA282DF090}"/>
+              </a:ext>
+            </a:extLst>
+          </p:cNvPr>
+          <p:cNvSpPr txBox="1"/>
+          <p:nvPr/>
+        </p:nvSpPr>
+        <p:spPr>
+          <a:xfrm>
+            <a:off x="8287232" y="2504901"/>
+            <a:ext cx="2975156" cy="461665"/>
+          </a:xfrm>
+          <a:prstGeom prst="rect">
+            <a:avLst/>
+          </a:prstGeom>
+          <a:noFill/>
+        </p:spPr>
+        <p:txBody>
+          <a:bodyPr wrap="square" lIns="91440" tIns="45720" rIns="91440" bIns="45720" rtlCol="0" anchor="t">
+            <a:spAutoFit/>
+          </a:bodyPr>
+          <a:lstStyle/>
+          <a:p>
+            <a:pPr marL="342900" indent="-342900">
+              <a:buFont typeface="Arial" panose="020B0604020202020204" pitchFamily="34" charset="0"/>
+              <a:buChar char="•"/>
+            </a:pPr>
+            <a:r>
+              <a:rPr lang="hu-HU" sz="2400" b="1" dirty="0">
+                <a:solidFill>
+                  <a:schemeClr val="accent4">
+                    <a:lumMod val="75000"/>
+                  </a:schemeClr>
+                </a:solidFill>
+              </a:rPr>
+              <a:t>Backend </a:t>
+            </a:r>
+            <a:r>
+              <a:rPr lang="hu-HU" sz="2400" b="1" dirty="0" err="1">
+                <a:solidFill>
+                  <a:schemeClr val="accent4">
+                    <a:lumMod val="75000"/>
+                  </a:schemeClr>
+                </a:solidFill>
+              </a:rPr>
+              <a:t>Error</a:t>
+            </a:r>
+            <a:r>
+              <a:rPr lang="hu-HU" sz="2400" b="1" dirty="0">
+                <a:solidFill>
+                  <a:schemeClr val="accent4">
+                    <a:lumMod val="75000"/>
+                  </a:schemeClr>
+                </a:solidFill>
+              </a:rPr>
+              <a:t>:</a:t>
+            </a:r>
+            <a:endParaRPr lang="hu-HU" sz="2400" dirty="0">
+              <a:solidFill>
+                <a:schemeClr val="accent4">
+                  <a:lumMod val="75000"/>
+                </a:schemeClr>
+              </a:solidFill>
+              <a:ea typeface="Calibri"/>
+              <a:cs typeface="Calibri"/>
+            </a:endParaRPr>
+          </a:p>
+        </p:txBody>
+      </p:sp>
+      <p:pic>
+        <p:nvPicPr>
+          <p:cNvPr id="14" name="Kép 13" descr="A képen szöveg, képernyőkép, szoftver látható&#10;&#10;Lehet, hogy az AI által létrehozott tartalom helytelen.">
+            <a:extLst>
+              <a:ext uri="{FF2B5EF4-FFF2-40B4-BE49-F238E27FC236}">
+                <a16:creationId xmlns:a16="http://schemas.microsoft.com/office/drawing/2014/main" id="{1F661FF4-08C9-680E-6B37-90EB790FBE10}"/>
+              </a:ext>
+            </a:extLst>
+          </p:cNvPr>
+          <p:cNvPicPr>
+            <a:picLocks noChangeAspect="1"/>
+          </p:cNvPicPr>
+          <p:nvPr/>
+        </p:nvPicPr>
+        <p:blipFill>
+          <a:blip r:embed="rId4"/>
+          <a:stretch>
+            <a:fillRect/>
+          </a:stretch>
+        </p:blipFill>
+        <p:spPr>
+          <a:xfrm>
+            <a:off x="8284076" y="3146251"/>
+            <a:ext cx="3797083" cy="3039389"/>
+          </a:xfrm>
+          <a:prstGeom prst="rect">
+            <a:avLst/>
+          </a:prstGeom>
+          <a:ln w="57150">
+            <a:solidFill>
+              <a:schemeClr val="accent1">
+                <a:lumMod val="40000"/>
+                <a:lumOff val="60000"/>
+              </a:schemeClr>
+            </a:solidFill>
+          </a:ln>
+        </p:spPr>
+      </p:pic>
+    </p:spTree>
+    <p:extLst>
+      <p:ext uri="{BB962C8B-B14F-4D97-AF65-F5344CB8AC3E}">
+        <p14:creationId xmlns:p14="http://schemas.microsoft.com/office/powerpoint/2010/main" val="1110081679"/>
+      </p:ext>
+    </p:extLst>
+  </p:cSld>
+  <p:clrMapOvr>
+    <a:masterClrMapping/>
+  </p:clrMapOvr>
+  <p:transition spd="med">
+    <p:pull/>
+  </p:transition>
+</p:sld>
+</file>
+
+<file path=ppt/slides/slide11.xml><?xml version="1.0" encoding="utf-8"?>
+<p:sld xmlns:a="http://schemas.openxmlformats.org/drawingml/2006/main" xmlns:r="http://schemas.openxmlformats.org/officeDocument/2006/relationships" xmlns:p="http://schemas.openxmlformats.org/presentationml/2006/main">
+  <p:cSld>
+    <p:bg>
+      <p:bgPr>
+        <a:solidFill>
+          <a:schemeClr val="accent4">
+            <a:lumMod val="20000"/>
+            <a:lumOff val="80000"/>
+          </a:schemeClr>
+        </a:solidFill>
+        <a:effectLst/>
+      </p:bgPr>
+    </p:bg>
+    <p:spTree>
+      <p:nvGrpSpPr>
+        <p:cNvPr id="1" name="">
+          <a:extLst>
+            <a:ext uri="{FF2B5EF4-FFF2-40B4-BE49-F238E27FC236}">
+              <a16:creationId xmlns:a16="http://schemas.microsoft.com/office/drawing/2014/main" id="{4A260738-60DB-E084-C3AF-8B50F7A6E7F5}"/>
+            </a:ext>
+          </a:extLst>
+        </p:cNvPr>
+        <p:cNvGrpSpPr/>
+        <p:nvPr/>
+      </p:nvGrpSpPr>
+      <p:grpSpPr>
+        <a:xfrm>
+          <a:off x="0" y="0"/>
+          <a:ext cx="0" cy="0"/>
+          <a:chOff x="0" y="0"/>
+          <a:chExt cx="0" cy="0"/>
+        </a:xfrm>
+      </p:grpSpPr>
+      <p:sp>
+        <p:nvSpPr>
+          <p:cNvPr id="4" name="Téglalap 3">
+            <a:extLst>
+              <a:ext uri="{FF2B5EF4-FFF2-40B4-BE49-F238E27FC236}">
+                <a16:creationId xmlns:a16="http://schemas.microsoft.com/office/drawing/2014/main" id="{5F5D1995-DD41-9F29-4973-967989C204D6}"/>
+              </a:ext>
+            </a:extLst>
+          </p:cNvPr>
+          <p:cNvSpPr/>
+          <p:nvPr/>
+        </p:nvSpPr>
+        <p:spPr>
+          <a:xfrm>
+            <a:off x="0" y="0"/>
+            <a:ext cx="12192000" cy="819150"/>
+          </a:xfrm>
+          <a:prstGeom prst="rect">
+            <a:avLst/>
+          </a:prstGeom>
+          <a:solidFill>
+            <a:schemeClr val="accent1">
+              <a:lumMod val="60000"/>
+              <a:lumOff val="40000"/>
+            </a:schemeClr>
+          </a:solidFill>
+          <a:ln>
+            <a:noFill/>
+          </a:ln>
+        </p:spPr>
+        <p:style>
+          <a:lnRef idx="2">
+            <a:schemeClr val="accent1">
+              <a:shade val="50000"/>
+            </a:schemeClr>
+          </a:lnRef>
+          <a:fillRef idx="1">
+            <a:schemeClr val="accent1"/>
+          </a:fillRef>
+          <a:effectRef idx="0">
+            <a:schemeClr val="accent1"/>
+          </a:effectRef>
+          <a:fontRef idx="minor">
+            <a:schemeClr val="lt1"/>
+          </a:fontRef>
+        </p:style>
+        <p:txBody>
+          <a:bodyPr rtlCol="0" anchor="ctr"/>
+          <a:lstStyle/>
+          <a:p>
+            <a:pPr algn="ctr"/>
+            <a:endParaRPr lang="hu-HU">
+              <a:solidFill>
+                <a:schemeClr val="tx1"/>
+              </a:solidFill>
+            </a:endParaRPr>
+          </a:p>
+        </p:txBody>
+      </p:sp>
+      <p:pic>
+        <p:nvPicPr>
+          <p:cNvPr id="3" name="Kép 2">
+            <a:extLst>
+              <a:ext uri="{FF2B5EF4-FFF2-40B4-BE49-F238E27FC236}">
+                <a16:creationId xmlns:a16="http://schemas.microsoft.com/office/drawing/2014/main" id="{8645F653-C7CA-03D5-9376-8D8A02073B79}"/>
+              </a:ext>
+            </a:extLst>
+          </p:cNvPr>
+          <p:cNvPicPr>
+            <a:picLocks noChangeAspect="1"/>
+          </p:cNvPicPr>
+          <p:nvPr/>
+        </p:nvPicPr>
+        <p:blipFill>
+          <a:blip r:embed="rId2" cstate="print">
+            <a:extLst>
+              <a:ext uri="{28A0092B-C50C-407E-A947-70E740481C1C}">
+                <a14:useLocalDpi xmlns:a14="http://schemas.microsoft.com/office/drawing/2010/main" val="0"/>
+              </a:ext>
+            </a:extLst>
+          </a:blip>
+          <a:stretch>
+            <a:fillRect/>
+          </a:stretch>
+        </p:blipFill>
+        <p:spPr>
+          <a:xfrm>
+            <a:off x="140104" y="47687"/>
+            <a:ext cx="745721" cy="723776"/>
+          </a:xfrm>
+          <a:prstGeom prst="rect">
+            <a:avLst/>
+          </a:prstGeom>
+        </p:spPr>
+      </p:pic>
+      <p:sp>
+        <p:nvSpPr>
+          <p:cNvPr id="2" name="Szövegdoboz 1">
+            <a:extLst>
+              <a:ext uri="{FF2B5EF4-FFF2-40B4-BE49-F238E27FC236}">
+                <a16:creationId xmlns:a16="http://schemas.microsoft.com/office/drawing/2014/main" id="{DD5E631A-C885-3C5B-3398-D7D6B6553D3A}"/>
+              </a:ext>
+            </a:extLst>
+          </p:cNvPr>
+          <p:cNvSpPr txBox="1"/>
+          <p:nvPr/>
+        </p:nvSpPr>
+        <p:spPr>
+          <a:xfrm>
+            <a:off x="2801383" y="24854"/>
+            <a:ext cx="6589234" cy="769441"/>
+          </a:xfrm>
+          <a:prstGeom prst="rect">
+            <a:avLst/>
+          </a:prstGeom>
+          <a:noFill/>
+        </p:spPr>
+        <p:txBody>
+          <a:bodyPr wrap="square" lIns="91440" tIns="45720" rIns="91440" bIns="45720" rtlCol="0" anchor="t">
+            <a:spAutoFit/>
+          </a:bodyPr>
+          <a:lstStyle/>
+          <a:p>
+            <a:pPr algn="ctr"/>
+            <a:r>
+              <a:rPr lang="hu-HU" sz="4400" b="1" dirty="0">
+                <a:ln w="6350">
+                  <a:solidFill>
+                    <a:schemeClr val="accent1">
+                      <a:lumMod val="75000"/>
+                    </a:schemeClr>
+                  </a:solidFill>
+                </a:ln>
+                <a:solidFill>
+                  <a:schemeClr val="bg1"/>
+                </a:solidFill>
+                <a:latin typeface="Ink Free"/>
+              </a:rPr>
+              <a:t>Testing </a:t>
+            </a:r>
+            <a:r>
+              <a:rPr lang="hu-HU" sz="4400" b="1" dirty="0" err="1">
+                <a:ln w="6350">
+                  <a:solidFill>
+                    <a:schemeClr val="accent1">
+                      <a:lumMod val="75000"/>
+                    </a:schemeClr>
+                  </a:solidFill>
+                </a:ln>
+                <a:solidFill>
+                  <a:schemeClr val="bg1"/>
+                </a:solidFill>
+                <a:latin typeface="Ink Free"/>
+              </a:rPr>
+              <a:t>results</a:t>
+            </a:r>
+            <a:endParaRPr lang="hu-HU" sz="4400" b="1" dirty="0" err="1">
+              <a:ln w="6350">
+                <a:solidFill>
+                  <a:schemeClr val="accent1">
+                    <a:lumMod val="75000"/>
+                  </a:schemeClr>
+                </a:solidFill>
+              </a:ln>
+              <a:solidFill>
+                <a:schemeClr val="bg1"/>
+              </a:solidFill>
+              <a:latin typeface="Ink Free" panose="03080402000500000000" pitchFamily="66" charset="0"/>
+            </a:endParaRPr>
+          </a:p>
+        </p:txBody>
+      </p:sp>
+      <p:sp>
+        <p:nvSpPr>
+          <p:cNvPr id="12" name="Szövegdoboz 11">
+            <a:extLst>
+              <a:ext uri="{FF2B5EF4-FFF2-40B4-BE49-F238E27FC236}">
+                <a16:creationId xmlns:a16="http://schemas.microsoft.com/office/drawing/2014/main" id="{EF6A9E11-F589-DFDD-582C-EFCEE8D8F4BA}"/>
+              </a:ext>
+            </a:extLst>
+          </p:cNvPr>
+          <p:cNvSpPr txBox="1"/>
+          <p:nvPr/>
+        </p:nvSpPr>
+        <p:spPr>
+          <a:xfrm>
+            <a:off x="510659" y="970463"/>
+            <a:ext cx="11492853" cy="830997"/>
+          </a:xfrm>
+          <a:prstGeom prst="rect">
+            <a:avLst/>
+          </a:prstGeom>
+          <a:noFill/>
+        </p:spPr>
+        <p:txBody>
+          <a:bodyPr wrap="square" lIns="91440" tIns="45720" rIns="91440" bIns="45720" rtlCol="0" anchor="t">
+            <a:spAutoFit/>
+          </a:bodyPr>
+          <a:lstStyle/>
+          <a:p>
+            <a:pPr marL="342900" indent="-342900">
+              <a:buFont typeface="Arial" panose="020B0604020202020204" pitchFamily="34" charset="0"/>
+              <a:buChar char="•"/>
+            </a:pPr>
+            <a:r>
+              <a:rPr lang="hu-HU" sz="2400" b="1" dirty="0" err="1">
+                <a:solidFill>
+                  <a:schemeClr val="accent4">
+                    <a:lumMod val="75000"/>
+                  </a:schemeClr>
+                </a:solidFill>
+              </a:rPr>
+              <a:t>Correct</a:t>
+            </a:r>
+            <a:r>
+              <a:rPr lang="hu-HU" sz="2400" b="1" dirty="0">
+                <a:solidFill>
+                  <a:schemeClr val="accent4">
+                    <a:lumMod val="75000"/>
+                  </a:schemeClr>
+                </a:solidFill>
+              </a:rPr>
+              <a:t> start: </a:t>
+            </a:r>
+            <a:r>
+              <a:rPr lang="hu-HU" sz="2400" dirty="0" err="1">
+                <a:solidFill>
+                  <a:schemeClr val="accent4">
+                    <a:lumMod val="75000"/>
+                  </a:schemeClr>
+                </a:solidFill>
+              </a:rPr>
+              <a:t>If</a:t>
+            </a:r>
+            <a:r>
+              <a:rPr lang="hu-HU" sz="2400" dirty="0">
+                <a:solidFill>
+                  <a:schemeClr val="accent4">
+                    <a:lumMod val="75000"/>
+                  </a:schemeClr>
+                </a:solidFill>
+              </a:rPr>
+              <a:t> </a:t>
+            </a:r>
+            <a:r>
+              <a:rPr lang="hu-HU" sz="2400" dirty="0" err="1">
+                <a:solidFill>
+                  <a:schemeClr val="accent4">
+                    <a:lumMod val="75000"/>
+                  </a:schemeClr>
+                </a:solidFill>
+              </a:rPr>
+              <a:t>everything</a:t>
+            </a:r>
+            <a:r>
+              <a:rPr lang="hu-HU" sz="2400" dirty="0">
+                <a:solidFill>
+                  <a:schemeClr val="accent4">
+                    <a:lumMod val="75000"/>
+                  </a:schemeClr>
+                </a:solidFill>
+              </a:rPr>
+              <a:t> is </a:t>
+            </a:r>
+            <a:r>
+              <a:rPr lang="hu-HU" sz="2400" dirty="0" err="1">
+                <a:solidFill>
+                  <a:schemeClr val="accent4">
+                    <a:lumMod val="75000"/>
+                  </a:schemeClr>
+                </a:solidFill>
+              </a:rPr>
+              <a:t>fine</a:t>
+            </a:r>
+            <a:r>
+              <a:rPr lang="hu-HU" sz="2400" dirty="0">
+                <a:solidFill>
+                  <a:schemeClr val="accent4">
+                    <a:lumMod val="75000"/>
+                  </a:schemeClr>
+                </a:solidFill>
+              </a:rPr>
+              <a:t>, </a:t>
+            </a:r>
+            <a:r>
+              <a:rPr lang="hu-HU" sz="2400" dirty="0" err="1">
+                <a:solidFill>
+                  <a:schemeClr val="accent4">
+                    <a:lumMod val="75000"/>
+                  </a:schemeClr>
+                </a:solidFill>
+              </a:rPr>
+              <a:t>then</a:t>
+            </a:r>
+            <a:r>
+              <a:rPr lang="hu-HU" sz="2400" dirty="0">
+                <a:solidFill>
+                  <a:schemeClr val="accent4">
+                    <a:lumMod val="75000"/>
+                  </a:schemeClr>
+                </a:solidFill>
+              </a:rPr>
+              <a:t> </a:t>
+            </a:r>
+            <a:r>
+              <a:rPr lang="hu-HU" sz="2400" dirty="0" err="1">
+                <a:solidFill>
+                  <a:schemeClr val="accent4">
+                    <a:lumMod val="75000"/>
+                  </a:schemeClr>
+                </a:solidFill>
+              </a:rPr>
+              <a:t>the</a:t>
+            </a:r>
+            <a:r>
+              <a:rPr lang="hu-HU" sz="2400" dirty="0">
+                <a:solidFill>
+                  <a:schemeClr val="accent4">
+                    <a:lumMod val="75000"/>
+                  </a:schemeClr>
+                </a:solidFill>
+              </a:rPr>
+              <a:t> website </a:t>
+            </a:r>
+            <a:r>
+              <a:rPr lang="hu-HU" sz="2400" dirty="0" err="1">
+                <a:solidFill>
+                  <a:schemeClr val="accent4">
+                    <a:lumMod val="75000"/>
+                  </a:schemeClr>
+                </a:solidFill>
+              </a:rPr>
+              <a:t>will</a:t>
+            </a:r>
+            <a:r>
+              <a:rPr lang="hu-HU" sz="2400" dirty="0">
+                <a:solidFill>
+                  <a:schemeClr val="accent4">
+                    <a:lumMod val="75000"/>
+                  </a:schemeClr>
+                </a:solidFill>
+              </a:rPr>
+              <a:t> </a:t>
+            </a:r>
+            <a:r>
+              <a:rPr lang="hu-HU" sz="2400" dirty="0" err="1">
+                <a:solidFill>
+                  <a:schemeClr val="accent4">
+                    <a:lumMod val="75000"/>
+                  </a:schemeClr>
+                </a:solidFill>
+              </a:rPr>
+              <a:t>run</a:t>
+            </a:r>
+            <a:r>
+              <a:rPr lang="hu-HU" sz="2400" dirty="0">
+                <a:solidFill>
+                  <a:schemeClr val="accent4">
+                    <a:lumMod val="75000"/>
+                  </a:schemeClr>
+                </a:solidFill>
+              </a:rPr>
+              <a:t>/</a:t>
+            </a:r>
+            <a:r>
+              <a:rPr lang="hu-HU" sz="2400" dirty="0" err="1">
+                <a:solidFill>
+                  <a:schemeClr val="accent4">
+                    <a:lumMod val="75000"/>
+                  </a:schemeClr>
+                </a:solidFill>
+              </a:rPr>
+              <a:t>work</a:t>
+            </a:r>
+            <a:r>
+              <a:rPr lang="hu-HU" sz="2400" dirty="0">
+                <a:solidFill>
+                  <a:schemeClr val="accent4">
+                    <a:lumMod val="75000"/>
+                  </a:schemeClr>
+                </a:solidFill>
+              </a:rPr>
+              <a:t> </a:t>
+            </a:r>
+            <a:r>
+              <a:rPr lang="hu-HU" sz="2400" dirty="0" err="1">
+                <a:solidFill>
+                  <a:schemeClr val="accent4">
+                    <a:lumMod val="75000"/>
+                  </a:schemeClr>
+                </a:solidFill>
+              </a:rPr>
+              <a:t>properly</a:t>
+            </a:r>
+            <a:r>
+              <a:rPr lang="hu-HU" sz="2400" dirty="0">
+                <a:solidFill>
+                  <a:schemeClr val="accent4">
+                    <a:lumMod val="75000"/>
+                  </a:schemeClr>
+                </a:solidFill>
+              </a:rPr>
+              <a:t>, </a:t>
+            </a:r>
+            <a:r>
+              <a:rPr lang="hu-HU" sz="2400" dirty="0" err="1">
+                <a:solidFill>
+                  <a:schemeClr val="accent4">
+                    <a:lumMod val="75000"/>
+                  </a:schemeClr>
+                </a:solidFill>
+              </a:rPr>
+              <a:t>that</a:t>
+            </a:r>
+            <a:r>
+              <a:rPr lang="hu-HU" sz="2400" dirty="0">
+                <a:solidFill>
+                  <a:schemeClr val="accent4">
+                    <a:lumMod val="75000"/>
+                  </a:schemeClr>
+                </a:solidFill>
+              </a:rPr>
+              <a:t> </a:t>
+            </a:r>
+            <a:r>
+              <a:rPr lang="hu-HU" sz="2400" dirty="0" err="1">
+                <a:solidFill>
+                  <a:schemeClr val="accent4">
+                    <a:lumMod val="75000"/>
+                  </a:schemeClr>
+                </a:solidFill>
+              </a:rPr>
+              <a:t>means</a:t>
+            </a:r>
+            <a:r>
+              <a:rPr lang="hu-HU" sz="2400" dirty="0">
+                <a:solidFill>
+                  <a:schemeClr val="accent4">
+                    <a:lumMod val="75000"/>
+                  </a:schemeClr>
+                </a:solidFill>
+              </a:rPr>
+              <a:t>, </a:t>
+            </a:r>
+            <a:r>
+              <a:rPr lang="hu-HU" sz="2400" dirty="0" err="1">
+                <a:solidFill>
+                  <a:schemeClr val="accent4">
+                    <a:lumMod val="75000"/>
+                  </a:schemeClr>
+                </a:solidFill>
+              </a:rPr>
+              <a:t>you</a:t>
+            </a:r>
+            <a:r>
+              <a:rPr lang="hu-HU" sz="2400" dirty="0">
+                <a:solidFill>
+                  <a:schemeClr val="accent4">
+                    <a:lumMod val="75000"/>
+                  </a:schemeClr>
+                </a:solidFill>
+              </a:rPr>
+              <a:t> </a:t>
+            </a:r>
+            <a:r>
+              <a:rPr lang="hu-HU" sz="2400" dirty="0" err="1">
+                <a:solidFill>
+                  <a:schemeClr val="accent4">
+                    <a:lumMod val="75000"/>
+                  </a:schemeClr>
+                </a:solidFill>
+              </a:rPr>
+              <a:t>can</a:t>
+            </a:r>
+            <a:r>
+              <a:rPr lang="hu-HU" sz="2400" dirty="0">
+                <a:solidFill>
+                  <a:schemeClr val="accent4">
+                    <a:lumMod val="75000"/>
+                  </a:schemeClr>
+                </a:solidFill>
+              </a:rPr>
+              <a:t> surf </a:t>
+            </a:r>
+            <a:r>
+              <a:rPr lang="hu-HU" sz="2400" dirty="0" err="1">
+                <a:solidFill>
+                  <a:schemeClr val="accent4">
+                    <a:lumMod val="75000"/>
+                  </a:schemeClr>
+                </a:solidFill>
+              </a:rPr>
+              <a:t>around</a:t>
+            </a:r>
+            <a:r>
+              <a:rPr lang="hu-HU" sz="2400" dirty="0">
+                <a:solidFill>
+                  <a:schemeClr val="accent4">
+                    <a:lumMod val="75000"/>
+                  </a:schemeClr>
+                </a:solidFill>
+              </a:rPr>
+              <a:t> </a:t>
+            </a:r>
+            <a:r>
+              <a:rPr lang="hu-HU" sz="2400" dirty="0" err="1">
+                <a:solidFill>
+                  <a:schemeClr val="accent4">
+                    <a:lumMod val="75000"/>
+                  </a:schemeClr>
+                </a:solidFill>
+              </a:rPr>
+              <a:t>the</a:t>
+            </a:r>
+            <a:r>
+              <a:rPr lang="hu-HU" sz="2400" dirty="0">
+                <a:solidFill>
+                  <a:schemeClr val="accent4">
+                    <a:lumMod val="75000"/>
+                  </a:schemeClr>
+                </a:solidFill>
+              </a:rPr>
+              <a:t> website.</a:t>
+            </a:r>
+            <a:endParaRPr lang="hu-HU" sz="2400" dirty="0" err="1">
+              <a:solidFill>
+                <a:schemeClr val="accent4">
+                  <a:lumMod val="75000"/>
+                </a:schemeClr>
+              </a:solidFill>
+              <a:ea typeface="Calibri"/>
+              <a:cs typeface="Calibri"/>
+            </a:endParaRPr>
+          </a:p>
+        </p:txBody>
+      </p:sp>
+      <p:sp>
+        <p:nvSpPr>
+          <p:cNvPr id="5" name="Szövegdoboz 4">
+            <a:extLst>
+              <a:ext uri="{FF2B5EF4-FFF2-40B4-BE49-F238E27FC236}">
+                <a16:creationId xmlns:a16="http://schemas.microsoft.com/office/drawing/2014/main" id="{ADE88030-41A8-67C0-0580-7E1E07209B0F}"/>
+              </a:ext>
+            </a:extLst>
+          </p:cNvPr>
+          <p:cNvSpPr txBox="1"/>
+          <p:nvPr/>
+        </p:nvSpPr>
+        <p:spPr>
+          <a:xfrm>
+            <a:off x="5761151" y="2170872"/>
+            <a:ext cx="2975155" cy="461665"/>
+          </a:xfrm>
+          <a:prstGeom prst="rect">
+            <a:avLst/>
+          </a:prstGeom>
+          <a:noFill/>
+        </p:spPr>
+        <p:txBody>
+          <a:bodyPr wrap="square" lIns="91440" tIns="45720" rIns="91440" bIns="45720" rtlCol="0" anchor="t">
+            <a:spAutoFit/>
+          </a:bodyPr>
+          <a:lstStyle/>
+          <a:p>
+            <a:pPr marL="342900" indent="-342900">
+              <a:buFont typeface="Arial" panose="020B0604020202020204" pitchFamily="34" charset="0"/>
+              <a:buChar char="•"/>
+            </a:pPr>
+            <a:r>
+              <a:rPr lang="hu-HU" sz="2400" b="1" dirty="0">
+                <a:solidFill>
+                  <a:schemeClr val="accent4">
+                    <a:lumMod val="75000"/>
+                  </a:schemeClr>
+                </a:solidFill>
+              </a:rPr>
+              <a:t>Backend </a:t>
+            </a:r>
+            <a:r>
+              <a:rPr lang="hu-HU" sz="2400" b="1" dirty="0" err="1">
+                <a:solidFill>
+                  <a:schemeClr val="accent4">
+                    <a:lumMod val="75000"/>
+                  </a:schemeClr>
+                </a:solidFill>
+              </a:rPr>
+              <a:t>Response</a:t>
+            </a:r>
+            <a:r>
+              <a:rPr lang="hu-HU" sz="2400" b="1" dirty="0">
+                <a:solidFill>
+                  <a:schemeClr val="accent4">
+                    <a:lumMod val="75000"/>
+                  </a:schemeClr>
+                </a:solidFill>
+              </a:rPr>
+              <a:t>:</a:t>
+            </a:r>
+            <a:endParaRPr lang="hu-HU" sz="2400" dirty="0">
+              <a:solidFill>
+                <a:schemeClr val="accent4">
+                  <a:lumMod val="75000"/>
+                </a:schemeClr>
+              </a:solidFill>
+              <a:ea typeface="Calibri"/>
+              <a:cs typeface="Calibri"/>
+            </a:endParaRPr>
+          </a:p>
+        </p:txBody>
+      </p:sp>
+      <p:pic>
+        <p:nvPicPr>
+          <p:cNvPr id="6" name="Kép 5" descr="A képen szöveg, képernyőkép, Betűtípus látható&#10;&#10;Lehet, hogy az AI által létrehozott tartalom helytelen.">
+            <a:extLst>
+              <a:ext uri="{FF2B5EF4-FFF2-40B4-BE49-F238E27FC236}">
+                <a16:creationId xmlns:a16="http://schemas.microsoft.com/office/drawing/2014/main" id="{E5F6A9AA-36ED-FFD6-2369-FE69C73D9FAB}"/>
+              </a:ext>
+            </a:extLst>
+          </p:cNvPr>
+          <p:cNvPicPr>
+            <a:picLocks noChangeAspect="1"/>
+          </p:cNvPicPr>
+          <p:nvPr/>
+        </p:nvPicPr>
+        <p:blipFill>
+          <a:blip r:embed="rId3"/>
+          <a:stretch>
+            <a:fillRect/>
+          </a:stretch>
+        </p:blipFill>
+        <p:spPr>
+          <a:xfrm>
+            <a:off x="4920706" y="2634901"/>
+            <a:ext cx="5857875" cy="1943100"/>
+          </a:xfrm>
+          <a:prstGeom prst="rect">
+            <a:avLst/>
+          </a:prstGeom>
+          <a:ln w="57150">
+            <a:solidFill>
+              <a:schemeClr val="accent1">
+                <a:lumMod val="40000"/>
+                <a:lumOff val="60000"/>
+              </a:schemeClr>
+            </a:solidFill>
+          </a:ln>
+        </p:spPr>
+      </p:pic>
+      <p:sp>
+        <p:nvSpPr>
+          <p:cNvPr id="7" name="Szövegdoboz 6">
+            <a:extLst>
+              <a:ext uri="{FF2B5EF4-FFF2-40B4-BE49-F238E27FC236}">
+                <a16:creationId xmlns:a16="http://schemas.microsoft.com/office/drawing/2014/main" id="{9CC0B129-F609-48E1-124B-97580742C7F7}"/>
+              </a:ext>
+            </a:extLst>
+          </p:cNvPr>
+          <p:cNvSpPr txBox="1"/>
+          <p:nvPr/>
+        </p:nvSpPr>
+        <p:spPr>
+          <a:xfrm>
+            <a:off x="510658" y="2170872"/>
+            <a:ext cx="3079538" cy="461665"/>
+          </a:xfrm>
+          <a:prstGeom prst="rect">
+            <a:avLst/>
+          </a:prstGeom>
+          <a:noFill/>
+        </p:spPr>
+        <p:txBody>
+          <a:bodyPr wrap="square" lIns="91440" tIns="45720" rIns="91440" bIns="45720" rtlCol="0" anchor="t">
+            <a:spAutoFit/>
+          </a:bodyPr>
+          <a:lstStyle/>
+          <a:p>
+            <a:pPr marL="342900" indent="-342900">
+              <a:buFont typeface="Arial" panose="020B0604020202020204" pitchFamily="34" charset="0"/>
+              <a:buChar char="•"/>
+            </a:pPr>
+            <a:r>
+              <a:rPr lang="hu-HU" sz="2400" b="1" dirty="0">
+                <a:solidFill>
+                  <a:schemeClr val="accent4">
+                    <a:lumMod val="75000"/>
+                  </a:schemeClr>
+                </a:solidFill>
+              </a:rPr>
+              <a:t>Frontend </a:t>
+            </a:r>
+            <a:r>
+              <a:rPr lang="hu-HU" sz="2400" b="1" dirty="0" err="1">
+                <a:solidFill>
+                  <a:schemeClr val="accent4">
+                    <a:lumMod val="75000"/>
+                  </a:schemeClr>
+                </a:solidFill>
+              </a:rPr>
+              <a:t>Response</a:t>
+            </a:r>
+            <a:r>
+              <a:rPr lang="hu-HU" sz="2400" b="1" dirty="0">
+                <a:solidFill>
+                  <a:schemeClr val="accent4">
+                    <a:lumMod val="75000"/>
+                  </a:schemeClr>
+                </a:solidFill>
+              </a:rPr>
+              <a:t>:</a:t>
+            </a:r>
+            <a:endParaRPr lang="hu-HU" sz="2400" dirty="0">
+              <a:solidFill>
+                <a:schemeClr val="accent4">
+                  <a:lumMod val="75000"/>
+                </a:schemeClr>
+              </a:solidFill>
+              <a:ea typeface="Calibri"/>
+              <a:cs typeface="Calibri"/>
+            </a:endParaRPr>
+          </a:p>
+        </p:txBody>
+      </p:sp>
+      <p:pic>
+        <p:nvPicPr>
+          <p:cNvPr id="9" name="Kép 8" descr="A képen szöveg, képernyőkép, szám, Betűtípus látható&#10;&#10;Lehet, hogy az AI által létrehozott tartalom helytelen.">
+            <a:extLst>
+              <a:ext uri="{FF2B5EF4-FFF2-40B4-BE49-F238E27FC236}">
+                <a16:creationId xmlns:a16="http://schemas.microsoft.com/office/drawing/2014/main" id="{898A8500-5FCF-37D7-58F5-2E0E2961ED7E}"/>
+              </a:ext>
+            </a:extLst>
+          </p:cNvPr>
+          <p:cNvPicPr>
+            <a:picLocks noChangeAspect="1"/>
+          </p:cNvPicPr>
+          <p:nvPr/>
+        </p:nvPicPr>
+        <p:blipFill>
+          <a:blip r:embed="rId4"/>
+          <a:stretch>
+            <a:fillRect/>
+          </a:stretch>
+        </p:blipFill>
+        <p:spPr>
+          <a:xfrm>
+            <a:off x="599495" y="2630466"/>
+            <a:ext cx="3320821" cy="4133590"/>
+          </a:xfrm>
+          <a:prstGeom prst="rect">
+            <a:avLst/>
+          </a:prstGeom>
+          <a:ln w="57150">
+            <a:solidFill>
+              <a:schemeClr val="accent1">
+                <a:lumMod val="40000"/>
+                <a:lumOff val="60000"/>
+              </a:schemeClr>
+            </a:solidFill>
+          </a:ln>
+        </p:spPr>
+      </p:pic>
+    </p:spTree>
+    <p:extLst>
+      <p:ext uri="{BB962C8B-B14F-4D97-AF65-F5344CB8AC3E}">
+        <p14:creationId xmlns:p14="http://schemas.microsoft.com/office/powerpoint/2010/main" val="2780969407"/>
+      </p:ext>
+    </p:extLst>
+  </p:cSld>
+  <p:clrMapOvr>
+    <a:masterClrMapping/>
+  </p:clrMapOvr>
+  <p:transition spd="med">
+    <p:pull/>
+  </p:transition>
+</p:sld>
+</file>
+
+<file path=ppt/slides/slide12.xml><?xml version="1.0" encoding="utf-8"?>
+<p:sld xmlns:a="http://schemas.openxmlformats.org/drawingml/2006/main" xmlns:r="http://schemas.openxmlformats.org/officeDocument/2006/relationships" xmlns:p="http://schemas.openxmlformats.org/presentationml/2006/main">
+  <p:cSld>
+    <p:bg>
+      <p:bgPr>
+        <a:solidFill>
+          <a:schemeClr val="accent4">
+            <a:lumMod val="20000"/>
+            <a:lumOff val="80000"/>
+          </a:schemeClr>
+        </a:solidFill>
+        <a:effectLst/>
+      </p:bgPr>
+    </p:bg>
+    <p:spTree>
+      <p:nvGrpSpPr>
+        <p:cNvPr id="1" name="">
+          <a:extLst>
+            <a:ext uri="{FF2B5EF4-FFF2-40B4-BE49-F238E27FC236}">
               <a16:creationId xmlns:a16="http://schemas.microsoft.com/office/drawing/2014/main" id="{94DB6896-9C86-E033-83AD-4B860B987120}"/>
             </a:ext>
           </a:extLst>
@@ -4015,7 +5883,7 @@
           <a:p>
             <a:pPr algn="ctr"/>
             <a:r>
-              <a:rPr lang="hu-HU" sz="4400" b="1">
+              <a:rPr lang="hu-HU" sz="4400" b="1" err="1">
                 <a:ln w="6350">
                   <a:solidFill>
                     <a:schemeClr val="accent1">
@@ -4028,9 +5896,9 @@
                 </a:solidFill>
                 <a:latin typeface="Ink Free"/>
               </a:rPr>
-              <a:t>Stock text</a:t>
-            </a:r>
-            <a:endParaRPr lang="hu-HU"/>
+              <a:t>Database</a:t>
+            </a:r>
+            <a:endParaRPr lang="hu-HU" err="1"/>
           </a:p>
         </p:txBody>
       </p:sp>
@@ -4844,7 +6712,7 @@
 </p:sld>
 </file>
 
-<file path=ppt/slides/slide11.xml><?xml version="1.0" encoding="utf-8"?>
+<file path=ppt/slides/slide13.xml><?xml version="1.0" encoding="utf-8"?>
 <p:sld xmlns:a="http://schemas.openxmlformats.org/drawingml/2006/main" xmlns:r="http://schemas.openxmlformats.org/officeDocument/2006/relationships" xmlns:p="http://schemas.openxmlformats.org/presentationml/2006/main">
   <p:cSld>
     <p:bg>
@@ -5143,7 +7011,7 @@
               <a:t> </a:t>
             </a:r>
             <a:r>
-              <a:rPr lang="hu-HU" sz="2400" b="1" dirty="0" err="1" smtClean="0">
+              <a:rPr lang="hu-HU" sz="2400" b="1" dirty="0" err="1">
                 <a:solidFill>
                   <a:schemeClr val="accent4">
                     <a:lumMod val="75000"/>
@@ -5153,17 +7021,17 @@
               <a:t>Friendly</a:t>
             </a:r>
             <a:r>
-              <a:rPr lang="hu-HU" sz="2400" b="1" dirty="0" smtClean="0">
-                <a:solidFill>
-                  <a:schemeClr val="accent4">
-                    <a:lumMod val="75000"/>
-                  </a:schemeClr>
-                </a:solidFill>
-              </a:rPr>
-              <a:t> </a:t>
-            </a:r>
-            <a:r>
-              <a:rPr lang="hu-HU" sz="2400" b="1" dirty="0" err="1" smtClean="0">
+              <a:rPr lang="hu-HU" sz="2400" b="1" dirty="0">
+                <a:solidFill>
+                  <a:schemeClr val="accent4">
+                    <a:lumMod val="75000"/>
+                  </a:schemeClr>
+                </a:solidFill>
+              </a:rPr>
+              <a:t> </a:t>
+            </a:r>
+            <a:r>
+              <a:rPr lang="hu-HU" sz="2400" b="1" dirty="0" err="1">
                 <a:solidFill>
                   <a:schemeClr val="accent4">
                     <a:lumMod val="75000"/>
@@ -5173,7 +7041,7 @@
               <a:t>interface</a:t>
             </a:r>
             <a:r>
-              <a:rPr lang="hu-HU" sz="2400" dirty="0" smtClean="0">
+              <a:rPr lang="hu-HU" sz="2400" dirty="0">
                 <a:solidFill>
                   <a:schemeClr val="accent4">
                     <a:lumMod val="75000"/>
@@ -5183,7 +7051,7 @@
               <a:t>:</a:t>
             </a:r>
             <a:r>
-              <a:rPr lang="hu-HU" sz="2400" b="1" dirty="0" smtClean="0">
+              <a:rPr lang="hu-HU" sz="2400" b="1" dirty="0">
                 <a:solidFill>
                   <a:schemeClr val="accent4">
                     <a:lumMod val="75000"/>
@@ -5219,7 +7087,7 @@
         <p:spPr>
           <a:xfrm>
             <a:off x="7096125" y="1191290"/>
-            <a:ext cx="4414210" cy="830997"/>
+            <a:ext cx="4414210" cy="1569660"/>
           </a:xfrm>
           <a:prstGeom prst="rect">
             <a:avLst/>
@@ -5237,7 +7105,7 @@
               <a:buChar char="•"/>
             </a:pPr>
             <a:r>
-              <a:rPr lang="hu-HU" sz="2400" b="1" dirty="0" err="1" smtClean="0">
+              <a:rPr lang="hu-HU" sz="2400" b="1" dirty="0" err="1">
                 <a:solidFill>
                   <a:schemeClr val="accent4">
                     <a:lumMod val="75000"/>
@@ -5247,7 +7115,7 @@
               <a:t>Error</a:t>
             </a:r>
             <a:r>
-              <a:rPr lang="hu-HU" sz="2400" b="1" dirty="0" smtClean="0">
+              <a:rPr lang="hu-HU" sz="2400" b="1" dirty="0">
                 <a:solidFill>
                   <a:schemeClr val="accent4">
                     <a:lumMod val="75000"/>
@@ -5274,8 +7142,89 @@
                   </a:schemeClr>
                 </a:solidFill>
               </a:rPr>
-              <a:t>:</a:t>
-            </a:r>
+              <a:t>: </a:t>
+            </a:r>
+            <a:r>
+              <a:rPr lang="hu-HU" sz="2400" dirty="0" err="1">
+                <a:solidFill>
+                  <a:schemeClr val="accent4">
+                    <a:lumMod val="75000"/>
+                  </a:schemeClr>
+                </a:solidFill>
+              </a:rPr>
+              <a:t>the</a:t>
+            </a:r>
+            <a:r>
+              <a:rPr lang="hu-HU" sz="2400" dirty="0">
+                <a:solidFill>
+                  <a:schemeClr val="accent4">
+                    <a:lumMod val="75000"/>
+                  </a:schemeClr>
+                </a:solidFill>
+              </a:rPr>
+              <a:t> website </a:t>
+            </a:r>
+            <a:r>
+              <a:rPr lang="hu-HU" sz="2400" dirty="0" err="1">
+                <a:solidFill>
+                  <a:schemeClr val="accent4">
+                    <a:lumMod val="75000"/>
+                  </a:schemeClr>
+                </a:solidFill>
+              </a:rPr>
+              <a:t>gives</a:t>
+            </a:r>
+            <a:r>
+              <a:rPr lang="hu-HU" sz="2400" dirty="0">
+                <a:solidFill>
+                  <a:schemeClr val="accent4">
+                    <a:lumMod val="75000"/>
+                  </a:schemeClr>
+                </a:solidFill>
+              </a:rPr>
+              <a:t> </a:t>
+            </a:r>
+            <a:r>
+              <a:rPr lang="hu-HU" sz="2400" dirty="0" err="1">
+                <a:solidFill>
+                  <a:schemeClr val="accent4">
+                    <a:lumMod val="75000"/>
+                  </a:schemeClr>
+                </a:solidFill>
+              </a:rPr>
+              <a:t>obvious</a:t>
+            </a:r>
+            <a:r>
+              <a:rPr lang="hu-HU" sz="2400" dirty="0">
+                <a:solidFill>
+                  <a:schemeClr val="accent4">
+                    <a:lumMod val="75000"/>
+                  </a:schemeClr>
+                </a:solidFill>
+              </a:rPr>
+              <a:t> </a:t>
+            </a:r>
+            <a:r>
+              <a:rPr lang="hu-HU" sz="2400" dirty="0" err="1">
+                <a:solidFill>
+                  <a:schemeClr val="accent4">
+                    <a:lumMod val="75000"/>
+                  </a:schemeClr>
+                </a:solidFill>
+              </a:rPr>
+              <a:t>warnings</a:t>
+            </a:r>
+          </a:p>
+          <a:p>
+            <a:endParaRPr lang="hu-HU" sz="2400" dirty="0">
+              <a:solidFill>
+                <a:schemeClr val="accent4">
+                  <a:lumMod val="75000"/>
+                </a:schemeClr>
+              </a:solidFill>
+              <a:ea typeface="Calibri"/>
+              <a:cs typeface="Calibri"/>
+            </a:endParaRPr>
           </a:p>
           <a:p>
             <a:r>
@@ -5315,7 +7264,7 @@
         </p:blipFill>
         <p:spPr>
           <a:xfrm>
-            <a:off x="7096125" y="3647342"/>
+            <a:off x="7096125" y="3956000"/>
             <a:ext cx="4343400" cy="2476500"/>
           </a:xfrm>
           <a:prstGeom prst="rect">
@@ -5353,7 +7302,7 @@
         </p:blipFill>
         <p:spPr>
           <a:xfrm>
-            <a:off x="7096125" y="2895600"/>
+            <a:off x="7096125" y="3204258"/>
             <a:ext cx="4972050" cy="447675"/>
           </a:xfrm>
           <a:prstGeom prst="rect">
@@ -5383,7 +7332,7 @@
         </p:blipFill>
         <p:spPr>
           <a:xfrm>
-            <a:off x="7096125" y="2108677"/>
+            <a:off x="7096125" y="2417335"/>
             <a:ext cx="3524250" cy="571500"/>
           </a:xfrm>
           <a:prstGeom prst="rect">
@@ -5413,7 +7362,7 @@
         </p:blipFill>
         <p:spPr>
           <a:xfrm>
-            <a:off x="3031679" y="2156314"/>
+            <a:off x="3177816" y="2145876"/>
             <a:ext cx="3667125" cy="3295650"/>
           </a:xfrm>
           <a:prstGeom prst="rect">
@@ -5445,7 +7394,7 @@
         </p:blipFill>
         <p:spPr>
           <a:xfrm>
-            <a:off x="72397" y="2136531"/>
+            <a:off x="135027" y="2146969"/>
             <a:ext cx="2801383" cy="3621651"/>
           </a:xfrm>
           <a:prstGeom prst="rect">
@@ -5465,6 +7414,1638 @@
     <p:extLst>
       <p:ext uri="{BB962C8B-B14F-4D97-AF65-F5344CB8AC3E}">
         <p14:creationId xmlns:p14="http://schemas.microsoft.com/office/powerpoint/2010/main" val="724213369"/>
+      </p:ext>
+    </p:extLst>
+  </p:cSld>
+  <p:clrMapOvr>
+    <a:masterClrMapping/>
+  </p:clrMapOvr>
+  <p:transition spd="med">
+    <p:pull/>
+  </p:transition>
+</p:sld>
+</file>
+
+<file path=ppt/slides/slide14.xml><?xml version="1.0" encoding="utf-8"?>
+<p:sld xmlns:a="http://schemas.openxmlformats.org/drawingml/2006/main" xmlns:r="http://schemas.openxmlformats.org/officeDocument/2006/relationships" xmlns:p="http://schemas.openxmlformats.org/presentationml/2006/main">
+  <p:cSld>
+    <p:bg>
+      <p:bgPr>
+        <a:solidFill>
+          <a:schemeClr val="accent4">
+            <a:lumMod val="20000"/>
+            <a:lumOff val="80000"/>
+          </a:schemeClr>
+        </a:solidFill>
+        <a:effectLst/>
+      </p:bgPr>
+    </p:bg>
+    <p:spTree>
+      <p:nvGrpSpPr>
+        <p:cNvPr id="1" name="">
+          <a:extLst>
+            <a:ext uri="{FF2B5EF4-FFF2-40B4-BE49-F238E27FC236}">
+              <a16:creationId xmlns:a16="http://schemas.microsoft.com/office/drawing/2014/main" id="{093FDFC5-6B53-CF5A-C9EB-5A1EAB9AF346}"/>
+            </a:ext>
+          </a:extLst>
+        </p:cNvPr>
+        <p:cNvGrpSpPr/>
+        <p:nvPr/>
+      </p:nvGrpSpPr>
+      <p:grpSpPr>
+        <a:xfrm>
+          <a:off x="0" y="0"/>
+          <a:ext cx="0" cy="0"/>
+          <a:chOff x="0" y="0"/>
+          <a:chExt cx="0" cy="0"/>
+        </a:xfrm>
+      </p:grpSpPr>
+      <p:sp>
+        <p:nvSpPr>
+          <p:cNvPr id="4" name="Téglalap 3">
+            <a:extLst>
+              <a:ext uri="{FF2B5EF4-FFF2-40B4-BE49-F238E27FC236}">
+                <a16:creationId xmlns:a16="http://schemas.microsoft.com/office/drawing/2014/main" id="{388636D0-263B-C9FE-6BA0-7E96C0FD0126}"/>
+              </a:ext>
+            </a:extLst>
+          </p:cNvPr>
+          <p:cNvSpPr/>
+          <p:nvPr/>
+        </p:nvSpPr>
+        <p:spPr>
+          <a:xfrm>
+            <a:off x="0" y="0"/>
+            <a:ext cx="12192000" cy="819150"/>
+          </a:xfrm>
+          <a:prstGeom prst="rect">
+            <a:avLst/>
+          </a:prstGeom>
+          <a:solidFill>
+            <a:schemeClr val="accent1">
+              <a:lumMod val="60000"/>
+              <a:lumOff val="40000"/>
+            </a:schemeClr>
+          </a:solidFill>
+          <a:ln>
+            <a:noFill/>
+          </a:ln>
+        </p:spPr>
+        <p:style>
+          <a:lnRef idx="2">
+            <a:schemeClr val="accent1">
+              <a:shade val="50000"/>
+            </a:schemeClr>
+          </a:lnRef>
+          <a:fillRef idx="1">
+            <a:schemeClr val="accent1"/>
+          </a:fillRef>
+          <a:effectRef idx="0">
+            <a:schemeClr val="accent1"/>
+          </a:effectRef>
+          <a:fontRef idx="minor">
+            <a:schemeClr val="lt1"/>
+          </a:fontRef>
+        </p:style>
+        <p:txBody>
+          <a:bodyPr rtlCol="0" anchor="ctr"/>
+          <a:lstStyle/>
+          <a:p>
+            <a:pPr algn="ctr"/>
+            <a:endParaRPr lang="hu-HU">
+              <a:solidFill>
+                <a:schemeClr val="tx1"/>
+              </a:solidFill>
+            </a:endParaRPr>
+          </a:p>
+        </p:txBody>
+      </p:sp>
+      <p:pic>
+        <p:nvPicPr>
+          <p:cNvPr id="3" name="Kép 2">
+            <a:extLst>
+              <a:ext uri="{FF2B5EF4-FFF2-40B4-BE49-F238E27FC236}">
+                <a16:creationId xmlns:a16="http://schemas.microsoft.com/office/drawing/2014/main" id="{F1EAEA51-9E58-B96C-A7A4-3FD8CB226D43}"/>
+              </a:ext>
+            </a:extLst>
+          </p:cNvPr>
+          <p:cNvPicPr>
+            <a:picLocks noChangeAspect="1"/>
+          </p:cNvPicPr>
+          <p:nvPr/>
+        </p:nvPicPr>
+        <p:blipFill>
+          <a:blip r:embed="rId2" cstate="print">
+            <a:extLst>
+              <a:ext uri="{28A0092B-C50C-407E-A947-70E740481C1C}">
+                <a14:useLocalDpi xmlns:a14="http://schemas.microsoft.com/office/drawing/2010/main" val="0"/>
+              </a:ext>
+            </a:extLst>
+          </a:blip>
+          <a:stretch>
+            <a:fillRect/>
+          </a:stretch>
+        </p:blipFill>
+        <p:spPr>
+          <a:xfrm>
+            <a:off x="140104" y="47687"/>
+            <a:ext cx="745721" cy="723776"/>
+          </a:xfrm>
+          <a:prstGeom prst="rect">
+            <a:avLst/>
+          </a:prstGeom>
+        </p:spPr>
+      </p:pic>
+      <p:sp>
+        <p:nvSpPr>
+          <p:cNvPr id="2" name="Szövegdoboz 1">
+            <a:extLst>
+              <a:ext uri="{FF2B5EF4-FFF2-40B4-BE49-F238E27FC236}">
+                <a16:creationId xmlns:a16="http://schemas.microsoft.com/office/drawing/2014/main" id="{0C9DC7C9-E4AB-1E64-02AE-427317C4F318}"/>
+              </a:ext>
+            </a:extLst>
+          </p:cNvPr>
+          <p:cNvSpPr txBox="1"/>
+          <p:nvPr/>
+        </p:nvSpPr>
+        <p:spPr>
+          <a:xfrm>
+            <a:off x="2801383" y="24854"/>
+            <a:ext cx="6589234" cy="769441"/>
+          </a:xfrm>
+          <a:prstGeom prst="rect">
+            <a:avLst/>
+          </a:prstGeom>
+          <a:noFill/>
+        </p:spPr>
+        <p:txBody>
+          <a:bodyPr wrap="square" lIns="91440" tIns="45720" rIns="91440" bIns="45720" rtlCol="0" anchor="t">
+            <a:spAutoFit/>
+          </a:bodyPr>
+          <a:lstStyle/>
+          <a:p>
+            <a:pPr algn="ctr"/>
+            <a:r>
+              <a:rPr lang="hu-HU" sz="4400" b="1">
+                <a:ln w="6350">
+                  <a:solidFill>
+                    <a:schemeClr val="accent1">
+                      <a:lumMod val="75000"/>
+                    </a:schemeClr>
+                  </a:solidFill>
+                </a:ln>
+                <a:solidFill>
+                  <a:schemeClr val="bg1"/>
+                </a:solidFill>
+                <a:latin typeface="Ink Free"/>
+              </a:rPr>
+              <a:t>WPF </a:t>
+            </a:r>
+            <a:r>
+              <a:rPr lang="hu-HU" sz="4400" b="1" err="1">
+                <a:ln w="6350">
+                  <a:solidFill>
+                    <a:schemeClr val="accent1">
+                      <a:lumMod val="75000"/>
+                    </a:schemeClr>
+                  </a:solidFill>
+                </a:ln>
+                <a:solidFill>
+                  <a:schemeClr val="bg1"/>
+                </a:solidFill>
+                <a:latin typeface="Ink Free"/>
+              </a:rPr>
+              <a:t>admin</a:t>
+            </a:r>
+            <a:r>
+              <a:rPr lang="hu-HU" sz="4400" b="1">
+                <a:ln w="6350">
+                  <a:solidFill>
+                    <a:schemeClr val="accent1">
+                      <a:lumMod val="75000"/>
+                    </a:schemeClr>
+                  </a:solidFill>
+                </a:ln>
+                <a:solidFill>
+                  <a:schemeClr val="bg1"/>
+                </a:solidFill>
+                <a:latin typeface="Ink Free"/>
+              </a:rPr>
+              <a:t>  </a:t>
+            </a:r>
+            <a:r>
+              <a:rPr lang="hu-HU" sz="4400" b="1" err="1">
+                <a:ln w="6350">
+                  <a:solidFill>
+                    <a:schemeClr val="accent1">
+                      <a:lumMod val="75000"/>
+                    </a:schemeClr>
+                  </a:solidFill>
+                </a:ln>
+                <a:solidFill>
+                  <a:schemeClr val="bg1"/>
+                </a:solidFill>
+                <a:latin typeface="Ink Free"/>
+              </a:rPr>
+              <a:t>interface</a:t>
+            </a:r>
+            <a:endParaRPr lang="hu-HU" sz="4400" b="1" err="1">
+              <a:ln w="6350">
+                <a:solidFill>
+                  <a:srgbClr val="5B9BD5">
+                    <a:lumMod val="75000"/>
+                  </a:srgbClr>
+                </a:solidFill>
+              </a:ln>
+              <a:solidFill>
+                <a:schemeClr val="bg1"/>
+              </a:solidFill>
+              <a:latin typeface="Ink Free"/>
+            </a:endParaRPr>
+          </a:p>
+        </p:txBody>
+      </p:sp>
+      <p:sp>
+        <p:nvSpPr>
+          <p:cNvPr id="6" name="Szövegdoboz 5">
+            <a:extLst>
+              <a:ext uri="{FF2B5EF4-FFF2-40B4-BE49-F238E27FC236}">
+                <a16:creationId xmlns:a16="http://schemas.microsoft.com/office/drawing/2014/main" id="{016ABDD9-8195-8FD4-F8B5-477403D0D58E}"/>
+              </a:ext>
+            </a:extLst>
+          </p:cNvPr>
+          <p:cNvSpPr txBox="1"/>
+          <p:nvPr/>
+        </p:nvSpPr>
+        <p:spPr>
+          <a:xfrm>
+            <a:off x="269440" y="1128660"/>
+            <a:ext cx="4414210" cy="1938992"/>
+          </a:xfrm>
+          <a:prstGeom prst="rect">
+            <a:avLst/>
+          </a:prstGeom>
+          <a:noFill/>
+        </p:spPr>
+        <p:txBody>
+          <a:bodyPr wrap="square" lIns="91440" tIns="45720" rIns="91440" bIns="45720" rtlCol="0" anchor="t">
+            <a:spAutoFit/>
+          </a:bodyPr>
+          <a:lstStyle/>
+          <a:p>
+            <a:pPr marL="342900" indent="-342900">
+              <a:buFont typeface="Arial" panose="020B0604020202020204" pitchFamily="34" charset="0"/>
+              <a:buChar char="•"/>
+            </a:pPr>
+            <a:endParaRPr lang="hu-HU" sz="2400">
+              <a:solidFill>
+                <a:schemeClr val="accent4">
+                  <a:lumMod val="75000"/>
+                </a:schemeClr>
+              </a:solidFill>
+              <a:ea typeface="Calibri"/>
+              <a:cs typeface="Calibri"/>
+            </a:endParaRPr>
+          </a:p>
+          <a:p>
+            <a:r>
+              <a:rPr lang="hu-HU" sz="2400">
+                <a:solidFill>
+                  <a:schemeClr val="accent4">
+                    <a:lumMod val="75000"/>
+                  </a:schemeClr>
+                </a:solidFill>
+                <a:ea typeface="+mn-lt"/>
+                <a:cs typeface="+mn-lt"/>
+              </a:rPr>
+              <a:t>A </a:t>
+            </a:r>
+            <a:r>
+              <a:rPr lang="hu-HU" sz="2400" b="1">
+                <a:solidFill>
+                  <a:schemeClr val="accent4">
+                    <a:lumMod val="75000"/>
+                  </a:schemeClr>
+                </a:solidFill>
+                <a:ea typeface="+mn-lt"/>
+                <a:cs typeface="+mn-lt"/>
+              </a:rPr>
+              <a:t>WPF-</a:t>
+            </a:r>
+            <a:r>
+              <a:rPr lang="hu-HU" sz="2400" b="1" err="1">
+                <a:solidFill>
+                  <a:schemeClr val="accent4">
+                    <a:lumMod val="75000"/>
+                  </a:schemeClr>
+                </a:solidFill>
+                <a:ea typeface="+mn-lt"/>
+                <a:cs typeface="+mn-lt"/>
+              </a:rPr>
+              <a:t>based</a:t>
+            </a:r>
+            <a:r>
+              <a:rPr lang="hu-HU" sz="2400" b="1">
+                <a:solidFill>
+                  <a:schemeClr val="accent4">
+                    <a:lumMod val="75000"/>
+                  </a:schemeClr>
+                </a:solidFill>
+                <a:ea typeface="+mn-lt"/>
+                <a:cs typeface="+mn-lt"/>
+              </a:rPr>
+              <a:t> </a:t>
+            </a:r>
+            <a:r>
+              <a:rPr lang="hu-HU" sz="2400" b="1" err="1">
+                <a:solidFill>
+                  <a:schemeClr val="accent4">
+                    <a:lumMod val="75000"/>
+                  </a:schemeClr>
+                </a:solidFill>
+                <a:ea typeface="+mn-lt"/>
+                <a:cs typeface="+mn-lt"/>
+              </a:rPr>
+              <a:t>admin</a:t>
+            </a:r>
+            <a:r>
+              <a:rPr lang="hu-HU" sz="2400" b="1">
+                <a:solidFill>
+                  <a:schemeClr val="accent4">
+                    <a:lumMod val="75000"/>
+                  </a:schemeClr>
+                </a:solidFill>
+                <a:ea typeface="+mn-lt"/>
+                <a:cs typeface="+mn-lt"/>
+              </a:rPr>
+              <a:t> </a:t>
+            </a:r>
+            <a:r>
+              <a:rPr lang="hu-HU" sz="2400" b="1" err="1">
+                <a:solidFill>
+                  <a:schemeClr val="accent4">
+                    <a:lumMod val="75000"/>
+                  </a:schemeClr>
+                </a:solidFill>
+                <a:ea typeface="+mn-lt"/>
+                <a:cs typeface="+mn-lt"/>
+              </a:rPr>
+              <a:t>interface</a:t>
+            </a:r>
+            <a:r>
+              <a:rPr lang="hu-HU" sz="2400">
+                <a:solidFill>
+                  <a:schemeClr val="accent4">
+                    <a:lumMod val="75000"/>
+                  </a:schemeClr>
+                </a:solidFill>
+                <a:ea typeface="+mn-lt"/>
+                <a:cs typeface="+mn-lt"/>
+              </a:rPr>
+              <a:t> </a:t>
+            </a:r>
+            <a:r>
+              <a:rPr lang="hu-HU" sz="2400" err="1">
+                <a:solidFill>
+                  <a:schemeClr val="accent4">
+                    <a:lumMod val="75000"/>
+                  </a:schemeClr>
+                </a:solidFill>
+                <a:ea typeface="+mn-lt"/>
+                <a:cs typeface="+mn-lt"/>
+              </a:rPr>
+              <a:t>designed</a:t>
+            </a:r>
+            <a:r>
+              <a:rPr lang="hu-HU" sz="2400">
+                <a:solidFill>
+                  <a:schemeClr val="accent4">
+                    <a:lumMod val="75000"/>
+                  </a:schemeClr>
+                </a:solidFill>
+                <a:ea typeface="+mn-lt"/>
+                <a:cs typeface="+mn-lt"/>
+              </a:rPr>
+              <a:t> </a:t>
+            </a:r>
+            <a:r>
+              <a:rPr lang="hu-HU" sz="2400" err="1">
+                <a:solidFill>
+                  <a:schemeClr val="accent4">
+                    <a:lumMod val="75000"/>
+                  </a:schemeClr>
+                </a:solidFill>
+                <a:ea typeface="+mn-lt"/>
+                <a:cs typeface="+mn-lt"/>
+              </a:rPr>
+              <a:t>to</a:t>
+            </a:r>
+            <a:r>
+              <a:rPr lang="hu-HU" sz="2400">
+                <a:solidFill>
+                  <a:schemeClr val="accent4">
+                    <a:lumMod val="75000"/>
+                  </a:schemeClr>
+                </a:solidFill>
+                <a:ea typeface="+mn-lt"/>
+                <a:cs typeface="+mn-lt"/>
+              </a:rPr>
+              <a:t> </a:t>
+            </a:r>
+            <a:r>
+              <a:rPr lang="hu-HU" sz="2400" err="1">
+                <a:solidFill>
+                  <a:schemeClr val="accent4">
+                    <a:lumMod val="75000"/>
+                  </a:schemeClr>
+                </a:solidFill>
+                <a:ea typeface="+mn-lt"/>
+                <a:cs typeface="+mn-lt"/>
+              </a:rPr>
+              <a:t>manage</a:t>
+            </a:r>
+            <a:r>
+              <a:rPr lang="hu-HU" sz="2400">
+                <a:solidFill>
+                  <a:schemeClr val="accent4">
+                    <a:lumMod val="75000"/>
+                  </a:schemeClr>
+                </a:solidFill>
+                <a:ea typeface="+mn-lt"/>
+                <a:cs typeface="+mn-lt"/>
+              </a:rPr>
+              <a:t> </a:t>
+            </a:r>
+            <a:r>
+              <a:rPr lang="hu-HU" sz="2400" err="1">
+                <a:solidFill>
+                  <a:schemeClr val="accent4">
+                    <a:lumMod val="75000"/>
+                  </a:schemeClr>
+                </a:solidFill>
+                <a:ea typeface="+mn-lt"/>
+                <a:cs typeface="+mn-lt"/>
+              </a:rPr>
+              <a:t>user</a:t>
+            </a:r>
+            <a:r>
+              <a:rPr lang="hu-HU" sz="2400">
+                <a:solidFill>
+                  <a:schemeClr val="accent4">
+                    <a:lumMod val="75000"/>
+                  </a:schemeClr>
+                </a:solidFill>
+                <a:ea typeface="+mn-lt"/>
+                <a:cs typeface="+mn-lt"/>
+              </a:rPr>
+              <a:t> account </a:t>
+            </a:r>
+            <a:r>
+              <a:rPr lang="hu-HU" sz="2400" err="1">
+                <a:solidFill>
+                  <a:schemeClr val="accent4">
+                    <a:lumMod val="75000"/>
+                  </a:schemeClr>
+                </a:solidFill>
+                <a:ea typeface="+mn-lt"/>
+                <a:cs typeface="+mn-lt"/>
+              </a:rPr>
+              <a:t>verification</a:t>
+            </a:r>
+            <a:r>
+              <a:rPr lang="hu-HU" sz="2400">
+                <a:solidFill>
+                  <a:schemeClr val="accent4">
+                    <a:lumMod val="75000"/>
+                  </a:schemeClr>
+                </a:solidFill>
+                <a:ea typeface="+mn-lt"/>
+                <a:cs typeface="+mn-lt"/>
+              </a:rPr>
+              <a:t>.</a:t>
+            </a:r>
+            <a:endParaRPr lang="hu-HU">
+              <a:solidFill>
+                <a:schemeClr val="accent4">
+                  <a:lumMod val="75000"/>
+                </a:schemeClr>
+              </a:solidFill>
+            </a:endParaRPr>
+          </a:p>
+          <a:p>
+            <a:r>
+              <a:rPr lang="hu-HU" sz="2400">
+                <a:solidFill>
+                  <a:schemeClr val="accent4">
+                    <a:lumMod val="75000"/>
+                  </a:schemeClr>
+                </a:solidFill>
+                <a:ea typeface="Calibri"/>
+                <a:cs typeface="Calibri"/>
+              </a:rPr>
+              <a:t> </a:t>
+            </a:r>
+          </a:p>
+        </p:txBody>
+      </p:sp>
+      <p:pic>
+        <p:nvPicPr>
+          <p:cNvPr id="12" name="Kép 11" descr="A képen elektronika, szöveg, képernyőkép, képernyő látható&#10;&#10;Lehet, hogy az AI által létrehozott tartalom helytelen.">
+            <a:extLst>
+              <a:ext uri="{FF2B5EF4-FFF2-40B4-BE49-F238E27FC236}">
+                <a16:creationId xmlns:a16="http://schemas.microsoft.com/office/drawing/2014/main" id="{BB77BCA7-E97E-2223-8EA8-CBAA8A87D75C}"/>
+              </a:ext>
+            </a:extLst>
+          </p:cNvPr>
+          <p:cNvPicPr>
+            <a:picLocks noChangeAspect="1"/>
+          </p:cNvPicPr>
+          <p:nvPr/>
+        </p:nvPicPr>
+        <p:blipFill>
+          <a:blip r:embed="rId3"/>
+          <a:stretch>
+            <a:fillRect/>
+          </a:stretch>
+        </p:blipFill>
+        <p:spPr>
+          <a:xfrm>
+            <a:off x="404225" y="3588773"/>
+            <a:ext cx="4807385" cy="2613634"/>
+          </a:xfrm>
+          <a:prstGeom prst="rect">
+            <a:avLst/>
+          </a:prstGeom>
+        </p:spPr>
+      </p:pic>
+      <p:sp>
+        <p:nvSpPr>
+          <p:cNvPr id="15" name="Szövegdoboz 14">
+            <a:extLst>
+              <a:ext uri="{FF2B5EF4-FFF2-40B4-BE49-F238E27FC236}">
+                <a16:creationId xmlns:a16="http://schemas.microsoft.com/office/drawing/2014/main" id="{4D9A4788-3FB0-18D9-A064-521D39E3B8E6}"/>
+              </a:ext>
+            </a:extLst>
+          </p:cNvPr>
+          <p:cNvSpPr txBox="1"/>
+          <p:nvPr/>
+        </p:nvSpPr>
+        <p:spPr>
+          <a:xfrm>
+            <a:off x="6208863" y="3894823"/>
+            <a:ext cx="4414210" cy="2308324"/>
+          </a:xfrm>
+          <a:prstGeom prst="rect">
+            <a:avLst/>
+          </a:prstGeom>
+          <a:noFill/>
+        </p:spPr>
+        <p:txBody>
+          <a:bodyPr wrap="square" lIns="91440" tIns="45720" rIns="91440" bIns="45720" rtlCol="0" anchor="t">
+            <a:spAutoFit/>
+          </a:bodyPr>
+          <a:lstStyle/>
+          <a:p>
+            <a:pPr marL="342900" indent="-342900">
+              <a:buFont typeface="Arial" panose="020B0604020202020204" pitchFamily="34" charset="0"/>
+              <a:buChar char="•"/>
+            </a:pPr>
+            <a:endParaRPr lang="hu-HU" sz="2400">
+              <a:solidFill>
+                <a:schemeClr val="accent4">
+                  <a:lumMod val="75000"/>
+                </a:schemeClr>
+              </a:solidFill>
+              <a:ea typeface="Calibri"/>
+              <a:cs typeface="Calibri"/>
+            </a:endParaRPr>
+          </a:p>
+          <a:p>
+            <a:r>
+              <a:rPr lang="hu-HU" sz="2400">
+                <a:solidFill>
+                  <a:schemeClr val="accent4">
+                    <a:lumMod val="75000"/>
+                  </a:schemeClr>
+                </a:solidFill>
+                <a:ea typeface="+mn-lt"/>
+                <a:cs typeface="+mn-lt"/>
+              </a:rPr>
+              <a:t>The </a:t>
+            </a:r>
+            <a:r>
+              <a:rPr lang="hu-HU" sz="2400" err="1">
+                <a:solidFill>
+                  <a:schemeClr val="accent4">
+                    <a:lumMod val="75000"/>
+                  </a:schemeClr>
+                </a:solidFill>
+                <a:ea typeface="+mn-lt"/>
+                <a:cs typeface="+mn-lt"/>
+              </a:rPr>
+              <a:t>application</a:t>
+            </a:r>
+            <a:r>
+              <a:rPr lang="hu-HU" sz="2400">
+                <a:solidFill>
+                  <a:schemeClr val="accent4">
+                    <a:lumMod val="75000"/>
+                  </a:schemeClr>
+                </a:solidFill>
+                <a:ea typeface="+mn-lt"/>
+                <a:cs typeface="+mn-lt"/>
+              </a:rPr>
+              <a:t> is </a:t>
+            </a:r>
+            <a:r>
+              <a:rPr lang="hu-HU" sz="2400" b="1" err="1">
+                <a:solidFill>
+                  <a:schemeClr val="accent4">
+                    <a:lumMod val="75000"/>
+                  </a:schemeClr>
+                </a:solidFill>
+                <a:ea typeface="+mn-lt"/>
+                <a:cs typeface="+mn-lt"/>
+              </a:rPr>
+              <a:t>accessible</a:t>
+            </a:r>
+            <a:r>
+              <a:rPr lang="hu-HU" sz="2400" b="1">
+                <a:solidFill>
+                  <a:schemeClr val="accent4">
+                    <a:lumMod val="75000"/>
+                  </a:schemeClr>
+                </a:solidFill>
+                <a:ea typeface="+mn-lt"/>
+                <a:cs typeface="+mn-lt"/>
+              </a:rPr>
+              <a:t> </a:t>
+            </a:r>
+            <a:r>
+              <a:rPr lang="hu-HU" sz="2400" b="1" err="1">
+                <a:solidFill>
+                  <a:schemeClr val="accent4">
+                    <a:lumMod val="75000"/>
+                  </a:schemeClr>
+                </a:solidFill>
+                <a:ea typeface="+mn-lt"/>
+                <a:cs typeface="+mn-lt"/>
+              </a:rPr>
+              <a:t>only</a:t>
+            </a:r>
+            <a:r>
+              <a:rPr lang="hu-HU" sz="2400" b="1">
+                <a:solidFill>
+                  <a:schemeClr val="accent4">
+                    <a:lumMod val="75000"/>
+                  </a:schemeClr>
+                </a:solidFill>
+                <a:ea typeface="+mn-lt"/>
+                <a:cs typeface="+mn-lt"/>
+              </a:rPr>
+              <a:t> </a:t>
+            </a:r>
+            <a:r>
+              <a:rPr lang="hu-HU" sz="2400" b="1" err="1">
+                <a:solidFill>
+                  <a:schemeClr val="accent4">
+                    <a:lumMod val="75000"/>
+                  </a:schemeClr>
+                </a:solidFill>
+                <a:ea typeface="+mn-lt"/>
+                <a:cs typeface="+mn-lt"/>
+              </a:rPr>
+              <a:t>to</a:t>
+            </a:r>
+            <a:r>
+              <a:rPr lang="hu-HU" sz="2400" b="1">
+                <a:solidFill>
+                  <a:schemeClr val="accent4">
+                    <a:lumMod val="75000"/>
+                  </a:schemeClr>
+                </a:solidFill>
+                <a:ea typeface="+mn-lt"/>
+                <a:cs typeface="+mn-lt"/>
+              </a:rPr>
+              <a:t> </a:t>
+            </a:r>
+            <a:r>
+              <a:rPr lang="hu-HU" sz="2400" b="1" err="1">
+                <a:solidFill>
+                  <a:schemeClr val="accent4">
+                    <a:lumMod val="75000"/>
+                  </a:schemeClr>
+                </a:solidFill>
+                <a:ea typeface="+mn-lt"/>
+                <a:cs typeface="+mn-lt"/>
+              </a:rPr>
+              <a:t>administrators</a:t>
+            </a:r>
+            <a:r>
+              <a:rPr lang="hu-HU" sz="2400">
+                <a:solidFill>
+                  <a:schemeClr val="accent4">
+                    <a:lumMod val="75000"/>
+                  </a:schemeClr>
+                </a:solidFill>
+                <a:ea typeface="+mn-lt"/>
+                <a:cs typeface="+mn-lt"/>
+              </a:rPr>
+              <a:t> and </a:t>
+            </a:r>
+            <a:r>
+              <a:rPr lang="hu-HU" sz="2400" err="1">
+                <a:solidFill>
+                  <a:schemeClr val="accent4">
+                    <a:lumMod val="75000"/>
+                  </a:schemeClr>
+                </a:solidFill>
+                <a:ea typeface="+mn-lt"/>
+                <a:cs typeface="+mn-lt"/>
+              </a:rPr>
+              <a:t>allows</a:t>
+            </a:r>
+            <a:r>
+              <a:rPr lang="hu-HU" sz="2400">
+                <a:solidFill>
+                  <a:schemeClr val="accent4">
+                    <a:lumMod val="75000"/>
+                  </a:schemeClr>
+                </a:solidFill>
+                <a:ea typeface="+mn-lt"/>
+                <a:cs typeface="+mn-lt"/>
+              </a:rPr>
+              <a:t> </a:t>
+            </a:r>
+            <a:r>
+              <a:rPr lang="hu-HU" sz="2400" err="1">
+                <a:solidFill>
+                  <a:schemeClr val="accent4">
+                    <a:lumMod val="75000"/>
+                  </a:schemeClr>
+                </a:solidFill>
+                <a:ea typeface="+mn-lt"/>
+                <a:cs typeface="+mn-lt"/>
+              </a:rPr>
+              <a:t>them</a:t>
+            </a:r>
+            <a:r>
+              <a:rPr lang="hu-HU" sz="2400">
+                <a:solidFill>
+                  <a:schemeClr val="accent4">
+                    <a:lumMod val="75000"/>
+                  </a:schemeClr>
+                </a:solidFill>
+                <a:ea typeface="+mn-lt"/>
+                <a:cs typeface="+mn-lt"/>
+              </a:rPr>
+              <a:t> </a:t>
+            </a:r>
+            <a:r>
+              <a:rPr lang="hu-HU" sz="2400" err="1">
+                <a:solidFill>
+                  <a:schemeClr val="accent4">
+                    <a:lumMod val="75000"/>
+                  </a:schemeClr>
+                </a:solidFill>
+                <a:ea typeface="+mn-lt"/>
+                <a:cs typeface="+mn-lt"/>
+              </a:rPr>
+              <a:t>to</a:t>
+            </a:r>
+            <a:r>
+              <a:rPr lang="hu-HU" sz="2400">
+                <a:solidFill>
+                  <a:schemeClr val="accent4">
+                    <a:lumMod val="75000"/>
+                  </a:schemeClr>
+                </a:solidFill>
+                <a:ea typeface="+mn-lt"/>
+                <a:cs typeface="+mn-lt"/>
+              </a:rPr>
+              <a:t> </a:t>
+            </a:r>
+            <a:r>
+              <a:rPr lang="hu-HU" sz="2400" err="1">
+                <a:solidFill>
+                  <a:schemeClr val="accent4">
+                    <a:lumMod val="75000"/>
+                  </a:schemeClr>
+                </a:solidFill>
+                <a:ea typeface="+mn-lt"/>
+                <a:cs typeface="+mn-lt"/>
+              </a:rPr>
+              <a:t>review</a:t>
+            </a:r>
+            <a:r>
+              <a:rPr lang="hu-HU" sz="2400">
+                <a:solidFill>
+                  <a:schemeClr val="accent4">
+                    <a:lumMod val="75000"/>
+                  </a:schemeClr>
+                </a:solidFill>
+                <a:ea typeface="+mn-lt"/>
+                <a:cs typeface="+mn-lt"/>
+              </a:rPr>
+              <a:t> </a:t>
+            </a:r>
+            <a:r>
+              <a:rPr lang="hu-HU" sz="2400" err="1">
+                <a:solidFill>
+                  <a:schemeClr val="accent4">
+                    <a:lumMod val="75000"/>
+                  </a:schemeClr>
+                </a:solidFill>
+                <a:ea typeface="+mn-lt"/>
+                <a:cs typeface="+mn-lt"/>
+              </a:rPr>
+              <a:t>user</a:t>
+            </a:r>
+            <a:r>
+              <a:rPr lang="hu-HU" sz="2400">
+                <a:solidFill>
+                  <a:schemeClr val="accent4">
+                    <a:lumMod val="75000"/>
+                  </a:schemeClr>
+                </a:solidFill>
+                <a:ea typeface="+mn-lt"/>
+                <a:cs typeface="+mn-lt"/>
+              </a:rPr>
+              <a:t> </a:t>
+            </a:r>
+            <a:r>
+              <a:rPr lang="hu-HU" sz="2400" err="1">
+                <a:solidFill>
+                  <a:schemeClr val="accent4">
+                    <a:lumMod val="75000"/>
+                  </a:schemeClr>
+                </a:solidFill>
+                <a:ea typeface="+mn-lt"/>
+                <a:cs typeface="+mn-lt"/>
+              </a:rPr>
+              <a:t>details</a:t>
+            </a:r>
+            <a:r>
+              <a:rPr lang="hu-HU" sz="2400">
+                <a:solidFill>
+                  <a:schemeClr val="accent4">
+                    <a:lumMod val="75000"/>
+                  </a:schemeClr>
+                </a:solidFill>
+                <a:ea typeface="+mn-lt"/>
+                <a:cs typeface="+mn-lt"/>
+              </a:rPr>
+              <a:t> and </a:t>
+            </a:r>
+            <a:r>
+              <a:rPr lang="hu-HU" sz="2400" b="1" err="1">
+                <a:solidFill>
+                  <a:schemeClr val="accent4">
+                    <a:lumMod val="75000"/>
+                  </a:schemeClr>
+                </a:solidFill>
+                <a:ea typeface="+mn-lt"/>
+                <a:cs typeface="+mn-lt"/>
+              </a:rPr>
+              <a:t>approve</a:t>
+            </a:r>
+            <a:r>
+              <a:rPr lang="hu-HU" sz="2400" b="1">
+                <a:solidFill>
+                  <a:schemeClr val="accent4">
+                    <a:lumMod val="75000"/>
+                  </a:schemeClr>
+                </a:solidFill>
+                <a:ea typeface="+mn-lt"/>
+                <a:cs typeface="+mn-lt"/>
+              </a:rPr>
+              <a:t> account </a:t>
+            </a:r>
+            <a:r>
+              <a:rPr lang="hu-HU" sz="2400" b="1" err="1">
+                <a:solidFill>
+                  <a:schemeClr val="accent4">
+                    <a:lumMod val="75000"/>
+                  </a:schemeClr>
+                </a:solidFill>
+                <a:ea typeface="+mn-lt"/>
+                <a:cs typeface="+mn-lt"/>
+              </a:rPr>
+              <a:t>confirmations</a:t>
+            </a:r>
+            <a:endParaRPr lang="hu-HU" err="1">
+              <a:solidFill>
+                <a:schemeClr val="accent4">
+                  <a:lumMod val="75000"/>
+                </a:schemeClr>
+              </a:solidFill>
+            </a:endParaRPr>
+          </a:p>
+          <a:p>
+            <a:r>
+              <a:rPr lang="hu-HU" sz="2400">
+                <a:solidFill>
+                  <a:schemeClr val="accent4">
+                    <a:lumMod val="75000"/>
+                  </a:schemeClr>
+                </a:solidFill>
+                <a:ea typeface="Calibri"/>
+                <a:cs typeface="Calibri"/>
+              </a:rPr>
+              <a:t> </a:t>
+            </a:r>
+          </a:p>
+        </p:txBody>
+      </p:sp>
+      <p:pic>
+        <p:nvPicPr>
+          <p:cNvPr id="17" name="Kép 16">
+            <a:extLst>
+              <a:ext uri="{FF2B5EF4-FFF2-40B4-BE49-F238E27FC236}">
+                <a16:creationId xmlns:a16="http://schemas.microsoft.com/office/drawing/2014/main" id="{230D0B4F-8EB3-F3F2-A4E6-68552F239CA9}"/>
+              </a:ext>
+            </a:extLst>
+          </p:cNvPr>
+          <p:cNvPicPr>
+            <a:picLocks noChangeAspect="1"/>
+          </p:cNvPicPr>
+          <p:nvPr/>
+        </p:nvPicPr>
+        <p:blipFill>
+          <a:blip r:embed="rId4"/>
+          <a:stretch>
+            <a:fillRect/>
+          </a:stretch>
+        </p:blipFill>
+        <p:spPr>
+          <a:xfrm>
+            <a:off x="5700125" y="1211893"/>
+            <a:ext cx="5436818" cy="1970762"/>
+          </a:xfrm>
+          <a:prstGeom prst="rect">
+            <a:avLst/>
+          </a:prstGeom>
+        </p:spPr>
+      </p:pic>
+    </p:spTree>
+    <p:extLst>
+      <p:ext uri="{BB962C8B-B14F-4D97-AF65-F5344CB8AC3E}">
+        <p14:creationId xmlns:p14="http://schemas.microsoft.com/office/powerpoint/2010/main" val="2411412178"/>
+      </p:ext>
+    </p:extLst>
+  </p:cSld>
+  <p:clrMapOvr>
+    <a:masterClrMapping/>
+  </p:clrMapOvr>
+  <p:transition spd="med">
+    <p:pull/>
+  </p:transition>
+</p:sld>
+</file>
+
+<file path=ppt/slides/slide15.xml><?xml version="1.0" encoding="utf-8"?>
+<p:sld xmlns:a="http://schemas.openxmlformats.org/drawingml/2006/main" xmlns:r="http://schemas.openxmlformats.org/officeDocument/2006/relationships" xmlns:p="http://schemas.openxmlformats.org/presentationml/2006/main">
+  <p:cSld>
+    <p:bg>
+      <p:bgPr>
+        <a:solidFill>
+          <a:schemeClr val="accent4">
+            <a:lumMod val="20000"/>
+            <a:lumOff val="80000"/>
+          </a:schemeClr>
+        </a:solidFill>
+        <a:effectLst/>
+      </p:bgPr>
+    </p:bg>
+    <p:spTree>
+      <p:nvGrpSpPr>
+        <p:cNvPr id="1" name="">
+          <a:extLst>
+            <a:ext uri="{FF2B5EF4-FFF2-40B4-BE49-F238E27FC236}">
+              <a16:creationId xmlns:a16="http://schemas.microsoft.com/office/drawing/2014/main" id="{0AB5D026-9E56-B07A-C85D-F09B4336FE99}"/>
+            </a:ext>
+          </a:extLst>
+        </p:cNvPr>
+        <p:cNvGrpSpPr/>
+        <p:nvPr/>
+      </p:nvGrpSpPr>
+      <p:grpSpPr>
+        <a:xfrm>
+          <a:off x="0" y="0"/>
+          <a:ext cx="0" cy="0"/>
+          <a:chOff x="0" y="0"/>
+          <a:chExt cx="0" cy="0"/>
+        </a:xfrm>
+      </p:grpSpPr>
+      <p:sp>
+        <p:nvSpPr>
+          <p:cNvPr id="4" name="Téglalap 3">
+            <a:extLst>
+              <a:ext uri="{FF2B5EF4-FFF2-40B4-BE49-F238E27FC236}">
+                <a16:creationId xmlns:a16="http://schemas.microsoft.com/office/drawing/2014/main" id="{8B512E7B-64B3-2595-EF4A-5C58617ADC8E}"/>
+              </a:ext>
+            </a:extLst>
+          </p:cNvPr>
+          <p:cNvSpPr/>
+          <p:nvPr/>
+        </p:nvSpPr>
+        <p:spPr>
+          <a:xfrm>
+            <a:off x="0" y="0"/>
+            <a:ext cx="12192000" cy="819150"/>
+          </a:xfrm>
+          <a:prstGeom prst="rect">
+            <a:avLst/>
+          </a:prstGeom>
+          <a:solidFill>
+            <a:schemeClr val="accent1">
+              <a:lumMod val="60000"/>
+              <a:lumOff val="40000"/>
+            </a:schemeClr>
+          </a:solidFill>
+          <a:ln>
+            <a:noFill/>
+          </a:ln>
+        </p:spPr>
+        <p:style>
+          <a:lnRef idx="2">
+            <a:schemeClr val="accent1">
+              <a:shade val="50000"/>
+            </a:schemeClr>
+          </a:lnRef>
+          <a:fillRef idx="1">
+            <a:schemeClr val="accent1"/>
+          </a:fillRef>
+          <a:effectRef idx="0">
+            <a:schemeClr val="accent1"/>
+          </a:effectRef>
+          <a:fontRef idx="minor">
+            <a:schemeClr val="lt1"/>
+          </a:fontRef>
+        </p:style>
+        <p:txBody>
+          <a:bodyPr rtlCol="0" anchor="ctr"/>
+          <a:lstStyle/>
+          <a:p>
+            <a:pPr algn="ctr"/>
+            <a:endParaRPr lang="hu-HU">
+              <a:solidFill>
+                <a:schemeClr val="tx1"/>
+              </a:solidFill>
+            </a:endParaRPr>
+          </a:p>
+        </p:txBody>
+      </p:sp>
+      <p:pic>
+        <p:nvPicPr>
+          <p:cNvPr id="3" name="Kép 2">
+            <a:extLst>
+              <a:ext uri="{FF2B5EF4-FFF2-40B4-BE49-F238E27FC236}">
+                <a16:creationId xmlns:a16="http://schemas.microsoft.com/office/drawing/2014/main" id="{C1292C17-C40A-A2B1-1E3A-EEC7F9468CB4}"/>
+              </a:ext>
+            </a:extLst>
+          </p:cNvPr>
+          <p:cNvPicPr>
+            <a:picLocks noChangeAspect="1"/>
+          </p:cNvPicPr>
+          <p:nvPr/>
+        </p:nvPicPr>
+        <p:blipFill>
+          <a:blip r:embed="rId2" cstate="print">
+            <a:extLst>
+              <a:ext uri="{28A0092B-C50C-407E-A947-70E740481C1C}">
+                <a14:useLocalDpi xmlns:a14="http://schemas.microsoft.com/office/drawing/2010/main" val="0"/>
+              </a:ext>
+            </a:extLst>
+          </a:blip>
+          <a:stretch>
+            <a:fillRect/>
+          </a:stretch>
+        </p:blipFill>
+        <p:spPr>
+          <a:xfrm>
+            <a:off x="140104" y="47687"/>
+            <a:ext cx="745721" cy="723776"/>
+          </a:xfrm>
+          <a:prstGeom prst="rect">
+            <a:avLst/>
+          </a:prstGeom>
+        </p:spPr>
+      </p:pic>
+      <p:sp>
+        <p:nvSpPr>
+          <p:cNvPr id="2" name="Szövegdoboz 1">
+            <a:extLst>
+              <a:ext uri="{FF2B5EF4-FFF2-40B4-BE49-F238E27FC236}">
+                <a16:creationId xmlns:a16="http://schemas.microsoft.com/office/drawing/2014/main" id="{43971306-AD1D-785D-6151-E10F3A64FEC0}"/>
+              </a:ext>
+            </a:extLst>
+          </p:cNvPr>
+          <p:cNvSpPr txBox="1"/>
+          <p:nvPr/>
+        </p:nvSpPr>
+        <p:spPr>
+          <a:xfrm>
+            <a:off x="2801383" y="24854"/>
+            <a:ext cx="6589234" cy="769441"/>
+          </a:xfrm>
+          <a:prstGeom prst="rect">
+            <a:avLst/>
+          </a:prstGeom>
+          <a:noFill/>
+        </p:spPr>
+        <p:txBody>
+          <a:bodyPr wrap="square" lIns="91440" tIns="45720" rIns="91440" bIns="45720" rtlCol="0" anchor="t">
+            <a:spAutoFit/>
+          </a:bodyPr>
+          <a:lstStyle/>
+          <a:p>
+            <a:pPr algn="ctr"/>
+            <a:r>
+              <a:rPr lang="hu-HU" sz="4400" b="1" dirty="0">
+                <a:ln w="6350">
+                  <a:solidFill>
+                    <a:schemeClr val="accent1">
+                      <a:lumMod val="75000"/>
+                    </a:schemeClr>
+                  </a:solidFill>
+                </a:ln>
+                <a:solidFill>
+                  <a:schemeClr val="bg1"/>
+                </a:solidFill>
+                <a:latin typeface="Ink Free"/>
+              </a:rPr>
+              <a:t>Backend Server</a:t>
+            </a:r>
+            <a:endParaRPr lang="hu-HU" dirty="0"/>
+          </a:p>
+        </p:txBody>
+      </p:sp>
+      <p:sp>
+        <p:nvSpPr>
+          <p:cNvPr id="6" name="Szövegdoboz 5">
+            <a:extLst>
+              <a:ext uri="{FF2B5EF4-FFF2-40B4-BE49-F238E27FC236}">
+                <a16:creationId xmlns:a16="http://schemas.microsoft.com/office/drawing/2014/main" id="{731C7EAB-693F-D4B6-857C-99170E34439F}"/>
+              </a:ext>
+            </a:extLst>
+          </p:cNvPr>
+          <p:cNvSpPr txBox="1"/>
+          <p:nvPr/>
+        </p:nvSpPr>
+        <p:spPr>
+          <a:xfrm>
+            <a:off x="269440" y="1128660"/>
+            <a:ext cx="5332785" cy="1569660"/>
+          </a:xfrm>
+          <a:prstGeom prst="rect">
+            <a:avLst/>
+          </a:prstGeom>
+          <a:noFill/>
+        </p:spPr>
+        <p:txBody>
+          <a:bodyPr wrap="square" lIns="91440" tIns="45720" rIns="91440" bIns="45720" rtlCol="0" anchor="t">
+            <a:spAutoFit/>
+          </a:bodyPr>
+          <a:lstStyle/>
+          <a:p>
+            <a:pPr marL="342900" indent="-342900">
+              <a:buFont typeface="Arial" panose="020B0604020202020204" pitchFamily="34" charset="0"/>
+              <a:buChar char="•"/>
+            </a:pPr>
+            <a:endParaRPr lang="hu-HU" sz="2400">
+              <a:solidFill>
+                <a:schemeClr val="accent4">
+                  <a:lumMod val="75000"/>
+                </a:schemeClr>
+              </a:solidFill>
+              <a:ea typeface="Calibri"/>
+              <a:cs typeface="Calibri"/>
+            </a:endParaRPr>
+          </a:p>
+          <a:p>
+            <a:r>
+              <a:rPr lang="hu-HU" sz="2400" dirty="0">
+                <a:solidFill>
+                  <a:schemeClr val="accent4">
+                    <a:lumMod val="75000"/>
+                  </a:schemeClr>
+                </a:solidFill>
+                <a:ea typeface="+mn-lt"/>
+                <a:cs typeface="+mn-lt"/>
+              </a:rPr>
+              <a:t>The </a:t>
+            </a:r>
+            <a:r>
+              <a:rPr lang="hu-HU" sz="2400" b="1" dirty="0">
+                <a:solidFill>
+                  <a:schemeClr val="accent4">
+                    <a:lumMod val="75000"/>
+                  </a:schemeClr>
+                </a:solidFill>
+                <a:ea typeface="+mn-lt"/>
+                <a:cs typeface="+mn-lt"/>
+              </a:rPr>
+              <a:t>Backend Server</a:t>
+            </a:r>
+            <a:r>
+              <a:rPr lang="hu-HU" sz="2400" dirty="0">
+                <a:solidFill>
+                  <a:schemeClr val="accent4">
+                    <a:lumMod val="75000"/>
+                  </a:schemeClr>
+                </a:solidFill>
+                <a:ea typeface="+mn-lt"/>
+                <a:cs typeface="+mn-lt"/>
+              </a:rPr>
+              <a:t> is </a:t>
+            </a:r>
+            <a:r>
+              <a:rPr lang="hu-HU" sz="2400" err="1">
+                <a:solidFill>
+                  <a:schemeClr val="accent4">
+                    <a:lumMod val="75000"/>
+                  </a:schemeClr>
+                </a:solidFill>
+                <a:ea typeface="+mn-lt"/>
+                <a:cs typeface="+mn-lt"/>
+              </a:rPr>
+              <a:t>based</a:t>
+            </a:r>
+            <a:r>
+              <a:rPr lang="hu-HU" sz="2400" dirty="0">
+                <a:solidFill>
+                  <a:schemeClr val="accent4">
+                    <a:lumMod val="75000"/>
+                  </a:schemeClr>
+                </a:solidFill>
+                <a:ea typeface="+mn-lt"/>
+                <a:cs typeface="+mn-lt"/>
+              </a:rPr>
+              <a:t> </a:t>
+            </a:r>
+            <a:r>
+              <a:rPr lang="hu-HU" sz="2400" err="1">
+                <a:solidFill>
+                  <a:schemeClr val="accent4">
+                    <a:lumMod val="75000"/>
+                  </a:schemeClr>
+                </a:solidFill>
+                <a:ea typeface="+mn-lt"/>
+                <a:cs typeface="+mn-lt"/>
+              </a:rPr>
+              <a:t>on</a:t>
+            </a:r>
+            <a:r>
+              <a:rPr lang="hu-HU" sz="2400" dirty="0">
+                <a:solidFill>
+                  <a:schemeClr val="accent4">
+                    <a:lumMod val="75000"/>
+                  </a:schemeClr>
+                </a:solidFill>
+                <a:ea typeface="+mn-lt"/>
+                <a:cs typeface="+mn-lt"/>
+              </a:rPr>
+              <a:t> </a:t>
+            </a:r>
+            <a:r>
+              <a:rPr lang="hu-HU" sz="2400" err="1">
+                <a:solidFill>
+                  <a:schemeClr val="accent4">
+                    <a:lumMod val="75000"/>
+                  </a:schemeClr>
+                </a:solidFill>
+                <a:ea typeface="+mn-lt"/>
+                <a:cs typeface="+mn-lt"/>
+              </a:rPr>
+              <a:t>the</a:t>
+            </a:r>
+            <a:r>
+              <a:rPr lang="hu-HU" sz="2400" dirty="0">
+                <a:solidFill>
+                  <a:schemeClr val="accent4">
+                    <a:lumMod val="75000"/>
+                  </a:schemeClr>
+                </a:solidFill>
+                <a:ea typeface="+mn-lt"/>
+                <a:cs typeface="+mn-lt"/>
+              </a:rPr>
+              <a:t> </a:t>
+            </a:r>
+            <a:r>
+              <a:rPr lang="hu-HU" sz="2400" b="1" dirty="0">
+                <a:solidFill>
+                  <a:schemeClr val="accent4">
+                    <a:lumMod val="75000"/>
+                  </a:schemeClr>
+                </a:solidFill>
+                <a:ea typeface="+mn-lt"/>
+                <a:cs typeface="+mn-lt"/>
+              </a:rPr>
+              <a:t>CRUD</a:t>
+            </a:r>
+            <a:r>
+              <a:rPr lang="hu-HU" sz="2400" dirty="0">
+                <a:solidFill>
+                  <a:schemeClr val="accent4">
+                    <a:lumMod val="75000"/>
+                  </a:schemeClr>
+                </a:solidFill>
+                <a:ea typeface="+mn-lt"/>
+                <a:cs typeface="+mn-lt"/>
+              </a:rPr>
+              <a:t> (</a:t>
+            </a:r>
+            <a:r>
+              <a:rPr lang="hu-HU" sz="2400" err="1">
+                <a:solidFill>
+                  <a:schemeClr val="accent4">
+                    <a:lumMod val="75000"/>
+                  </a:schemeClr>
+                </a:solidFill>
+                <a:ea typeface="+mn-lt"/>
+                <a:cs typeface="+mn-lt"/>
+              </a:rPr>
+              <a:t>Create</a:t>
+            </a:r>
+            <a:r>
+              <a:rPr lang="hu-HU" sz="2400" dirty="0">
+                <a:solidFill>
+                  <a:schemeClr val="accent4">
+                    <a:lumMod val="75000"/>
+                  </a:schemeClr>
+                </a:solidFill>
+                <a:ea typeface="+mn-lt"/>
+                <a:cs typeface="+mn-lt"/>
+              </a:rPr>
+              <a:t>, Read ,Update, Delete)</a:t>
+            </a:r>
+            <a:endParaRPr lang="hu-HU" sz="2400" dirty="0">
+              <a:solidFill>
+                <a:schemeClr val="accent4">
+                  <a:lumMod val="75000"/>
+                </a:schemeClr>
+              </a:solidFill>
+              <a:ea typeface="Calibri"/>
+              <a:cs typeface="Calibri"/>
+            </a:endParaRPr>
+          </a:p>
+          <a:p>
+            <a:r>
+              <a:rPr lang="hu-HU" sz="2400" dirty="0">
+                <a:solidFill>
+                  <a:schemeClr val="accent4">
+                    <a:lumMod val="75000"/>
+                  </a:schemeClr>
+                </a:solidFill>
+                <a:ea typeface="Calibri"/>
+                <a:cs typeface="Calibri"/>
+              </a:rPr>
+              <a:t> </a:t>
+            </a:r>
+          </a:p>
+        </p:txBody>
+      </p:sp>
+      <p:pic>
+        <p:nvPicPr>
+          <p:cNvPr id="5" name="Kép 4" descr="A képen szöveg, képernyőkép, Betűtípus, sor látható&#10;&#10;Lehet, hogy az AI által létrehozott tartalom helytelen.">
+            <a:extLst>
+              <a:ext uri="{FF2B5EF4-FFF2-40B4-BE49-F238E27FC236}">
+                <a16:creationId xmlns:a16="http://schemas.microsoft.com/office/drawing/2014/main" id="{92E00D7B-F8EB-2B12-3346-D970F151A74B}"/>
+              </a:ext>
+            </a:extLst>
+          </p:cNvPr>
+          <p:cNvPicPr>
+            <a:picLocks noChangeAspect="1"/>
+          </p:cNvPicPr>
+          <p:nvPr/>
+        </p:nvPicPr>
+        <p:blipFill>
+          <a:blip r:embed="rId3"/>
+          <a:stretch>
+            <a:fillRect/>
+          </a:stretch>
+        </p:blipFill>
+        <p:spPr>
+          <a:xfrm>
+            <a:off x="5532786" y="1714435"/>
+            <a:ext cx="6658757" cy="1153568"/>
+          </a:xfrm>
+          <a:prstGeom prst="rect">
+            <a:avLst/>
+          </a:prstGeom>
+        </p:spPr>
+      </p:pic>
+      <p:sp>
+        <p:nvSpPr>
+          <p:cNvPr id="8" name="Szövegdoboz 7">
+            <a:extLst>
+              <a:ext uri="{FF2B5EF4-FFF2-40B4-BE49-F238E27FC236}">
+                <a16:creationId xmlns:a16="http://schemas.microsoft.com/office/drawing/2014/main" id="{EDBC3264-7440-6C6C-F96F-8A22EE831E9F}"/>
+              </a:ext>
+            </a:extLst>
+          </p:cNvPr>
+          <p:cNvSpPr txBox="1"/>
+          <p:nvPr/>
+        </p:nvSpPr>
+        <p:spPr>
+          <a:xfrm>
+            <a:off x="7765316" y="1252296"/>
+            <a:ext cx="2202717" cy="461665"/>
+          </a:xfrm>
+          <a:prstGeom prst="rect">
+            <a:avLst/>
+          </a:prstGeom>
+          <a:noFill/>
+        </p:spPr>
+        <p:txBody>
+          <a:bodyPr wrap="square" lIns="91440" tIns="45720" rIns="91440" bIns="45720" rtlCol="0" anchor="t">
+            <a:spAutoFit/>
+          </a:bodyPr>
+          <a:lstStyle/>
+          <a:p>
+            <a:pPr marL="342900" indent="-342900">
+              <a:buFont typeface="Arial" panose="020B0604020202020204" pitchFamily="34" charset="0"/>
+              <a:buChar char="•"/>
+            </a:pPr>
+            <a:r>
+              <a:rPr lang="hu-HU" sz="2400" b="1" dirty="0" err="1">
+                <a:solidFill>
+                  <a:schemeClr val="accent4">
+                    <a:lumMod val="75000"/>
+                  </a:schemeClr>
+                </a:solidFill>
+              </a:rPr>
+              <a:t>Early</a:t>
+            </a:r>
+            <a:r>
+              <a:rPr lang="hu-HU" sz="2400" b="1" dirty="0">
+                <a:solidFill>
+                  <a:schemeClr val="accent4">
+                    <a:lumMod val="75000"/>
+                  </a:schemeClr>
+                </a:solidFill>
+              </a:rPr>
+              <a:t> Access</a:t>
+            </a:r>
+            <a:endParaRPr lang="hu-HU" sz="2400" dirty="0">
+              <a:solidFill>
+                <a:schemeClr val="accent4">
+                  <a:lumMod val="75000"/>
+                </a:schemeClr>
+              </a:solidFill>
+              <a:ea typeface="Calibri"/>
+              <a:cs typeface="Calibri"/>
+            </a:endParaRPr>
+          </a:p>
+        </p:txBody>
+      </p:sp>
+      <p:pic>
+        <p:nvPicPr>
+          <p:cNvPr id="9" name="Kép 8" descr="A képen szöveg, képernyőkép, Betűtípus, zöld látható&#10;&#10;Lehet, hogy az AI által létrehozott tartalom helytelen.">
+            <a:extLst>
+              <a:ext uri="{FF2B5EF4-FFF2-40B4-BE49-F238E27FC236}">
+                <a16:creationId xmlns:a16="http://schemas.microsoft.com/office/drawing/2014/main" id="{73CB2955-B2BC-77B6-E0ED-27590DE5B46F}"/>
+              </a:ext>
+            </a:extLst>
+          </p:cNvPr>
+          <p:cNvPicPr>
+            <a:picLocks noChangeAspect="1"/>
+          </p:cNvPicPr>
+          <p:nvPr/>
+        </p:nvPicPr>
+        <p:blipFill>
+          <a:blip r:embed="rId4"/>
+          <a:stretch>
+            <a:fillRect/>
+          </a:stretch>
+        </p:blipFill>
+        <p:spPr>
+          <a:xfrm>
+            <a:off x="5790220" y="4116758"/>
+            <a:ext cx="4181475" cy="628650"/>
+          </a:xfrm>
+          <a:prstGeom prst="rect">
+            <a:avLst/>
+          </a:prstGeom>
+        </p:spPr>
+      </p:pic>
+      <p:pic>
+        <p:nvPicPr>
+          <p:cNvPr id="10" name="Kép 9" descr="A képen szöveg, képernyőkép, Betűtípus, sor látható&#10;&#10;Lehet, hogy az AI által létrehozott tartalom helytelen.">
+            <a:extLst>
+              <a:ext uri="{FF2B5EF4-FFF2-40B4-BE49-F238E27FC236}">
+                <a16:creationId xmlns:a16="http://schemas.microsoft.com/office/drawing/2014/main" id="{07F937F7-A26D-8CF5-C332-931003F22B14}"/>
+              </a:ext>
+            </a:extLst>
+          </p:cNvPr>
+          <p:cNvPicPr>
+            <a:picLocks noChangeAspect="1"/>
+          </p:cNvPicPr>
+          <p:nvPr/>
+        </p:nvPicPr>
+        <p:blipFill>
+          <a:blip r:embed="rId5"/>
+          <a:stretch>
+            <a:fillRect/>
+          </a:stretch>
+        </p:blipFill>
+        <p:spPr>
+          <a:xfrm>
+            <a:off x="4362777" y="5163203"/>
+            <a:ext cx="7172325" cy="866775"/>
+          </a:xfrm>
+          <a:prstGeom prst="rect">
+            <a:avLst/>
+          </a:prstGeom>
+        </p:spPr>
+      </p:pic>
+      <p:sp>
+        <p:nvSpPr>
+          <p:cNvPr id="11" name="Szövegdoboz 10">
+            <a:extLst>
+              <a:ext uri="{FF2B5EF4-FFF2-40B4-BE49-F238E27FC236}">
+                <a16:creationId xmlns:a16="http://schemas.microsoft.com/office/drawing/2014/main" id="{AF98DE5A-F766-854E-70F6-9B3E638E5978}"/>
+              </a:ext>
+            </a:extLst>
+          </p:cNvPr>
+          <p:cNvSpPr txBox="1"/>
+          <p:nvPr/>
+        </p:nvSpPr>
+        <p:spPr>
+          <a:xfrm>
+            <a:off x="144179" y="4625509"/>
+            <a:ext cx="3526950" cy="461665"/>
+          </a:xfrm>
+          <a:prstGeom prst="rect">
+            <a:avLst/>
+          </a:prstGeom>
+          <a:noFill/>
+        </p:spPr>
+        <p:txBody>
+          <a:bodyPr wrap="square" lIns="91440" tIns="45720" rIns="91440" bIns="45720" rtlCol="0" anchor="t">
+            <a:spAutoFit/>
+          </a:bodyPr>
+          <a:lstStyle/>
+          <a:p>
+            <a:pPr marL="342900" indent="-342900">
+              <a:buFont typeface="Arial" panose="020B0604020202020204" pitchFamily="34" charset="0"/>
+              <a:buChar char="•"/>
+            </a:pPr>
+            <a:r>
+              <a:rPr lang="hu-HU" sz="2400" dirty="0" err="1">
+                <a:solidFill>
+                  <a:schemeClr val="accent4">
+                    <a:lumMod val="75000"/>
+                  </a:schemeClr>
+                </a:solidFill>
+                <a:ea typeface="Calibri"/>
+                <a:cs typeface="Calibri"/>
+              </a:rPr>
+              <a:t>Successful</a:t>
+            </a:r>
+            <a:r>
+              <a:rPr lang="hu-HU" sz="2400" dirty="0">
+                <a:solidFill>
+                  <a:schemeClr val="accent4">
+                    <a:lumMod val="75000"/>
+                  </a:schemeClr>
+                </a:solidFill>
+                <a:ea typeface="Calibri"/>
+                <a:cs typeface="Calibri"/>
+              </a:rPr>
+              <a:t> </a:t>
+            </a:r>
+            <a:r>
+              <a:rPr lang="hu-HU" sz="2400" dirty="0" err="1">
+                <a:solidFill>
+                  <a:schemeClr val="accent4">
+                    <a:lumMod val="75000"/>
+                  </a:schemeClr>
+                </a:solidFill>
+                <a:ea typeface="Calibri"/>
+                <a:cs typeface="Calibri"/>
+              </a:rPr>
+              <a:t>Order</a:t>
+            </a:r>
+            <a:r>
+              <a:rPr lang="hu-HU" sz="2400" dirty="0">
+                <a:solidFill>
+                  <a:schemeClr val="accent4">
+                    <a:lumMod val="75000"/>
+                  </a:schemeClr>
+                </a:solidFill>
+                <a:ea typeface="Calibri"/>
+                <a:cs typeface="Calibri"/>
+              </a:rPr>
+              <a:t> (Post) </a:t>
+            </a:r>
+          </a:p>
+        </p:txBody>
+      </p:sp>
+    </p:spTree>
+    <p:extLst>
+      <p:ext uri="{BB962C8B-B14F-4D97-AF65-F5344CB8AC3E}">
+        <p14:creationId xmlns:p14="http://schemas.microsoft.com/office/powerpoint/2010/main" val="340467667"/>
       </p:ext>
     </p:extLst>
   </p:cSld>

</xml_diff>